<commit_message>
Adjustment of lang, menu, functions and mock-up of schedule
</commit_message>
<xml_diff>
--- a/docs/icons.pptx
+++ b/docs/icons.pptx
@@ -7,6 +7,7 @@
   <p:sldIdLst>
     <p:sldId id="256" r:id="rId2"/>
     <p:sldId id="257" r:id="rId3"/>
+    <p:sldId id="258" r:id="rId4"/>
   </p:sldIdLst>
   <p:sldSz cx="12192000" cy="6858000"/>
   <p:notesSz cx="6858000" cy="9144000"/>
@@ -105,6 +106,11 @@
       </a:defRPr>
     </a:lvl9pPr>
   </p:defaultTextStyle>
+  <p:extLst>
+    <p:ext uri="{EFAFB233-063F-42B5-8137-9DF3F51BA10A}">
+      <p15:sldGuideLst xmlns:p15="http://schemas.microsoft.com/office/powerpoint/2012/main"/>
+    </p:ext>
+  </p:extLst>
 </p:presentation>
 </file>
 
@@ -255,7 +261,7 @@
           <a:p>
             <a:fld id="{FD00C4DA-C7B8-4A22-9C82-0DEE3AFE6205}" type="datetimeFigureOut">
               <a:rPr lang="en-US" smtClean="0"/>
-              <a:t>3/6/2021</a:t>
+              <a:t>3/9/2021</a:t>
             </a:fld>
             <a:endParaRPr lang="en-US"/>
           </a:p>
@@ -453,7 +459,7 @@
           <a:p>
             <a:fld id="{FD00C4DA-C7B8-4A22-9C82-0DEE3AFE6205}" type="datetimeFigureOut">
               <a:rPr lang="en-US" smtClean="0"/>
-              <a:t>3/6/2021</a:t>
+              <a:t>3/9/2021</a:t>
             </a:fld>
             <a:endParaRPr lang="en-US"/>
           </a:p>
@@ -661,7 +667,7 @@
           <a:p>
             <a:fld id="{FD00C4DA-C7B8-4A22-9C82-0DEE3AFE6205}" type="datetimeFigureOut">
               <a:rPr lang="en-US" smtClean="0"/>
-              <a:t>3/6/2021</a:t>
+              <a:t>3/9/2021</a:t>
             </a:fld>
             <a:endParaRPr lang="en-US"/>
           </a:p>
@@ -859,7 +865,7 @@
           <a:p>
             <a:fld id="{FD00C4DA-C7B8-4A22-9C82-0DEE3AFE6205}" type="datetimeFigureOut">
               <a:rPr lang="en-US" smtClean="0"/>
-              <a:t>3/6/2021</a:t>
+              <a:t>3/9/2021</a:t>
             </a:fld>
             <a:endParaRPr lang="en-US"/>
           </a:p>
@@ -1134,7 +1140,7 @@
           <a:p>
             <a:fld id="{FD00C4DA-C7B8-4A22-9C82-0DEE3AFE6205}" type="datetimeFigureOut">
               <a:rPr lang="en-US" smtClean="0"/>
-              <a:t>3/6/2021</a:t>
+              <a:t>3/9/2021</a:t>
             </a:fld>
             <a:endParaRPr lang="en-US"/>
           </a:p>
@@ -1399,7 +1405,7 @@
           <a:p>
             <a:fld id="{FD00C4DA-C7B8-4A22-9C82-0DEE3AFE6205}" type="datetimeFigureOut">
               <a:rPr lang="en-US" smtClean="0"/>
-              <a:t>3/6/2021</a:t>
+              <a:t>3/9/2021</a:t>
             </a:fld>
             <a:endParaRPr lang="en-US"/>
           </a:p>
@@ -1811,7 +1817,7 @@
           <a:p>
             <a:fld id="{FD00C4DA-C7B8-4A22-9C82-0DEE3AFE6205}" type="datetimeFigureOut">
               <a:rPr lang="en-US" smtClean="0"/>
-              <a:t>3/6/2021</a:t>
+              <a:t>3/9/2021</a:t>
             </a:fld>
             <a:endParaRPr lang="en-US"/>
           </a:p>
@@ -1952,7 +1958,7 @@
           <a:p>
             <a:fld id="{FD00C4DA-C7B8-4A22-9C82-0DEE3AFE6205}" type="datetimeFigureOut">
               <a:rPr lang="en-US" smtClean="0"/>
-              <a:t>3/6/2021</a:t>
+              <a:t>3/9/2021</a:t>
             </a:fld>
             <a:endParaRPr lang="en-US"/>
           </a:p>
@@ -2065,7 +2071,7 @@
           <a:p>
             <a:fld id="{FD00C4DA-C7B8-4A22-9C82-0DEE3AFE6205}" type="datetimeFigureOut">
               <a:rPr lang="en-US" smtClean="0"/>
-              <a:t>3/6/2021</a:t>
+              <a:t>3/9/2021</a:t>
             </a:fld>
             <a:endParaRPr lang="en-US"/>
           </a:p>
@@ -2376,7 +2382,7 @@
           <a:p>
             <a:fld id="{FD00C4DA-C7B8-4A22-9C82-0DEE3AFE6205}" type="datetimeFigureOut">
               <a:rPr lang="en-US" smtClean="0"/>
-              <a:t>3/6/2021</a:t>
+              <a:t>3/9/2021</a:t>
             </a:fld>
             <a:endParaRPr lang="en-US"/>
           </a:p>
@@ -2664,7 +2670,7 @@
           <a:p>
             <a:fld id="{FD00C4DA-C7B8-4A22-9C82-0DEE3AFE6205}" type="datetimeFigureOut">
               <a:rPr lang="en-US" smtClean="0"/>
-              <a:t>3/6/2021</a:t>
+              <a:t>3/9/2021</a:t>
             </a:fld>
             <a:endParaRPr lang="en-US"/>
           </a:p>
@@ -2905,7 +2911,7 @@
           <a:p>
             <a:fld id="{FD00C4DA-C7B8-4A22-9C82-0DEE3AFE6205}" type="datetimeFigureOut">
               <a:rPr lang="en-US" smtClean="0"/>
-              <a:t>3/6/2021</a:t>
+              <a:t>3/9/2021</a:t>
             </a:fld>
             <a:endParaRPr lang="en-US"/>
           </a:p>
@@ -3970,10 +3976,10 @@
         </p:nvGrpSpPr>
         <p:grpSpPr>
           <a:xfrm>
-            <a:off x="3484436" y="1727200"/>
-            <a:ext cx="152400" cy="152400"/>
+            <a:off x="4965726" y="895139"/>
+            <a:ext cx="3600000" cy="3600000"/>
             <a:chOff x="3062796" y="1358282"/>
-            <a:chExt cx="3600000" cy="3600000"/>
+            <a:chExt cx="3600000" cy="3599999"/>
           </a:xfrm>
         </p:grpSpPr>
         <p:sp>
@@ -3991,7 +3997,7 @@
           <p:spPr>
             <a:xfrm>
               <a:off x="3062796" y="1358282"/>
-              <a:ext cx="3600000" cy="3600000"/>
+              <a:ext cx="3600000" cy="3599999"/>
             </a:xfrm>
             <a:prstGeom prst="rect">
               <a:avLst/>
@@ -4322,6 +4328,296 @@
 </p:sld>
 </file>
 
+<file path=ppt/slides/slide3.xml><?xml version="1.0" encoding="utf-8"?>
+<p:sld xmlns:a="http://schemas.openxmlformats.org/drawingml/2006/main" xmlns:r="http://schemas.openxmlformats.org/officeDocument/2006/relationships" xmlns:p="http://schemas.openxmlformats.org/presentationml/2006/main">
+  <p:cSld>
+    <p:spTree>
+      <p:nvGrpSpPr>
+        <p:cNvPr id="1" name=""/>
+        <p:cNvGrpSpPr/>
+        <p:nvPr/>
+      </p:nvGrpSpPr>
+      <p:grpSpPr>
+        <a:xfrm>
+          <a:off x="0" y="0"/>
+          <a:ext cx="0" cy="0"/>
+          <a:chOff x="0" y="0"/>
+          <a:chExt cx="0" cy="0"/>
+        </a:xfrm>
+      </p:grpSpPr>
+      <p:sp>
+        <p:nvSpPr>
+          <p:cNvPr id="4" name="Rectangle 3">
+            <a:extLst>
+              <a:ext uri="{FF2B5EF4-FFF2-40B4-BE49-F238E27FC236}">
+                <a16:creationId xmlns:a16="http://schemas.microsoft.com/office/drawing/2014/main" id="{74608DAA-8F82-417E-97F1-ED304F48A38A}"/>
+              </a:ext>
+            </a:extLst>
+          </p:cNvPr>
+          <p:cNvSpPr/>
+          <p:nvPr/>
+        </p:nvSpPr>
+        <p:spPr>
+          <a:xfrm>
+            <a:off x="4296000" y="1393792"/>
+            <a:ext cx="3600000" cy="3600000"/>
+          </a:xfrm>
+          <a:prstGeom prst="rect">
+            <a:avLst/>
+          </a:prstGeom>
+          <a:noFill/>
+          <a:ln>
+            <a:solidFill>
+              <a:srgbClr val="FFA500"/>
+            </a:solidFill>
+          </a:ln>
+        </p:spPr>
+        <p:style>
+          <a:lnRef idx="2">
+            <a:schemeClr val="accent1">
+              <a:shade val="50000"/>
+            </a:schemeClr>
+          </a:lnRef>
+          <a:fillRef idx="1">
+            <a:schemeClr val="accent1"/>
+          </a:fillRef>
+          <a:effectRef idx="0">
+            <a:schemeClr val="accent1"/>
+          </a:effectRef>
+          <a:fontRef idx="minor">
+            <a:schemeClr val="lt1"/>
+          </a:fontRef>
+        </p:style>
+        <p:txBody>
+          <a:bodyPr rtlCol="0" anchor="ctr"/>
+          <a:lstStyle/>
+          <a:p>
+            <a:pPr algn="ctr"/>
+            <a:endParaRPr lang="en-US"/>
+          </a:p>
+        </p:txBody>
+      </p:sp>
+      <p:sp>
+        <p:nvSpPr>
+          <p:cNvPr id="8" name="Rectangle: Rounded Corners 7">
+            <a:extLst>
+              <a:ext uri="{FF2B5EF4-FFF2-40B4-BE49-F238E27FC236}">
+                <a16:creationId xmlns:a16="http://schemas.microsoft.com/office/drawing/2014/main" id="{02749F8F-632E-48B2-AD49-579441A5D93E}"/>
+              </a:ext>
+            </a:extLst>
+          </p:cNvPr>
+          <p:cNvSpPr/>
+          <p:nvPr/>
+        </p:nvSpPr>
+        <p:spPr>
+          <a:xfrm>
+            <a:off x="4564200" y="1694392"/>
+            <a:ext cx="3063600" cy="799200"/>
+          </a:xfrm>
+          <a:prstGeom prst="roundRect">
+            <a:avLst/>
+          </a:prstGeom>
+          <a:solidFill>
+            <a:srgbClr val="FFA500"/>
+          </a:solidFill>
+          <a:ln>
+            <a:noFill/>
+          </a:ln>
+        </p:spPr>
+        <p:style>
+          <a:lnRef idx="2">
+            <a:schemeClr val="accent1">
+              <a:shade val="50000"/>
+            </a:schemeClr>
+          </a:lnRef>
+          <a:fillRef idx="1">
+            <a:schemeClr val="accent1"/>
+          </a:fillRef>
+          <a:effectRef idx="0">
+            <a:schemeClr val="accent1"/>
+          </a:effectRef>
+          <a:fontRef idx="minor">
+            <a:schemeClr val="lt1"/>
+          </a:fontRef>
+        </p:style>
+        <p:txBody>
+          <a:bodyPr rtlCol="0" anchor="ctr"/>
+          <a:lstStyle/>
+          <a:p>
+            <a:pPr algn="ctr"/>
+            <a:endParaRPr lang="en-US"/>
+          </a:p>
+        </p:txBody>
+      </p:sp>
+      <p:sp>
+        <p:nvSpPr>
+          <p:cNvPr id="9" name="Rectangle: Rounded Corners 8">
+            <a:extLst>
+              <a:ext uri="{FF2B5EF4-FFF2-40B4-BE49-F238E27FC236}">
+                <a16:creationId xmlns:a16="http://schemas.microsoft.com/office/drawing/2014/main" id="{BF112112-D704-43EB-8914-B06BAE72515C}"/>
+              </a:ext>
+            </a:extLst>
+          </p:cNvPr>
+          <p:cNvSpPr/>
+          <p:nvPr/>
+        </p:nvSpPr>
+        <p:spPr>
+          <a:xfrm>
+            <a:off x="4564200" y="2794192"/>
+            <a:ext cx="3063600" cy="799200"/>
+          </a:xfrm>
+          <a:prstGeom prst="roundRect">
+            <a:avLst/>
+          </a:prstGeom>
+          <a:solidFill>
+            <a:srgbClr val="FFA500"/>
+          </a:solidFill>
+          <a:ln>
+            <a:noFill/>
+          </a:ln>
+        </p:spPr>
+        <p:style>
+          <a:lnRef idx="2">
+            <a:schemeClr val="accent1">
+              <a:shade val="50000"/>
+            </a:schemeClr>
+          </a:lnRef>
+          <a:fillRef idx="1">
+            <a:schemeClr val="accent1"/>
+          </a:fillRef>
+          <a:effectRef idx="0">
+            <a:schemeClr val="accent1"/>
+          </a:effectRef>
+          <a:fontRef idx="minor">
+            <a:schemeClr val="lt1"/>
+          </a:fontRef>
+        </p:style>
+        <p:txBody>
+          <a:bodyPr rtlCol="0" anchor="ctr"/>
+          <a:lstStyle/>
+          <a:p>
+            <a:pPr algn="ctr"/>
+            <a:endParaRPr lang="en-US"/>
+          </a:p>
+        </p:txBody>
+      </p:sp>
+      <p:sp>
+        <p:nvSpPr>
+          <p:cNvPr id="10" name="Rectangle: Rounded Corners 9">
+            <a:extLst>
+              <a:ext uri="{FF2B5EF4-FFF2-40B4-BE49-F238E27FC236}">
+                <a16:creationId xmlns:a16="http://schemas.microsoft.com/office/drawing/2014/main" id="{6A2E5E80-40D7-44A4-A6F7-ED9ECC65AC08}"/>
+              </a:ext>
+            </a:extLst>
+          </p:cNvPr>
+          <p:cNvSpPr/>
+          <p:nvPr/>
+        </p:nvSpPr>
+        <p:spPr>
+          <a:xfrm>
+            <a:off x="4500175" y="1702131"/>
+            <a:ext cx="3063600" cy="799200"/>
+          </a:xfrm>
+          <a:prstGeom prst="roundRect">
+            <a:avLst/>
+          </a:prstGeom>
+          <a:solidFill>
+            <a:srgbClr val="FFA500"/>
+          </a:solidFill>
+          <a:ln>
+            <a:noFill/>
+          </a:ln>
+        </p:spPr>
+        <p:style>
+          <a:lnRef idx="2">
+            <a:schemeClr val="accent1">
+              <a:shade val="50000"/>
+            </a:schemeClr>
+          </a:lnRef>
+          <a:fillRef idx="1">
+            <a:schemeClr val="accent1"/>
+          </a:fillRef>
+          <a:effectRef idx="0">
+            <a:schemeClr val="accent1"/>
+          </a:effectRef>
+          <a:fontRef idx="minor">
+            <a:schemeClr val="lt1"/>
+          </a:fontRef>
+        </p:style>
+        <p:txBody>
+          <a:bodyPr rtlCol="0" anchor="ctr"/>
+          <a:lstStyle/>
+          <a:p>
+            <a:pPr algn="ctr"/>
+            <a:endParaRPr lang="en-US"/>
+          </a:p>
+        </p:txBody>
+      </p:sp>
+      <p:sp>
+        <p:nvSpPr>
+          <p:cNvPr id="11" name="Rectangle: Rounded Corners 10">
+            <a:extLst>
+              <a:ext uri="{FF2B5EF4-FFF2-40B4-BE49-F238E27FC236}">
+                <a16:creationId xmlns:a16="http://schemas.microsoft.com/office/drawing/2014/main" id="{4C99CDBF-134B-4137-ACEB-A700EBE85585}"/>
+              </a:ext>
+            </a:extLst>
+          </p:cNvPr>
+          <p:cNvSpPr/>
+          <p:nvPr/>
+        </p:nvSpPr>
+        <p:spPr>
+          <a:xfrm>
+            <a:off x="4564200" y="3886253"/>
+            <a:ext cx="3063600" cy="799200"/>
+          </a:xfrm>
+          <a:prstGeom prst="roundRect">
+            <a:avLst/>
+          </a:prstGeom>
+          <a:solidFill>
+            <a:srgbClr val="FFA500"/>
+          </a:solidFill>
+          <a:ln>
+            <a:noFill/>
+          </a:ln>
+        </p:spPr>
+        <p:style>
+          <a:lnRef idx="2">
+            <a:schemeClr val="accent1">
+              <a:shade val="50000"/>
+            </a:schemeClr>
+          </a:lnRef>
+          <a:fillRef idx="1">
+            <a:schemeClr val="accent1"/>
+          </a:fillRef>
+          <a:effectRef idx="0">
+            <a:schemeClr val="accent1"/>
+          </a:effectRef>
+          <a:fontRef idx="minor">
+            <a:schemeClr val="lt1"/>
+          </a:fontRef>
+        </p:style>
+        <p:txBody>
+          <a:bodyPr rtlCol="0" anchor="ctr"/>
+          <a:lstStyle/>
+          <a:p>
+            <a:pPr algn="ctr"/>
+            <a:endParaRPr lang="en-US"/>
+          </a:p>
+        </p:txBody>
+      </p:sp>
+    </p:spTree>
+    <p:extLst>
+      <p:ext uri="{BB962C8B-B14F-4D97-AF65-F5344CB8AC3E}">
+        <p14:creationId xmlns:p14="http://schemas.microsoft.com/office/powerpoint/2010/main" val="617473125"/>
+      </p:ext>
+    </p:extLst>
+  </p:cSld>
+  <p:clrMapOvr>
+    <a:masterClrMapping/>
+  </p:clrMapOvr>
+</p:sld>
+</file>
+
 <file path=ppt/theme/theme1.xml><?xml version="1.0" encoding="utf-8"?>
 <a:theme xmlns:a="http://schemas.openxmlformats.org/drawingml/2006/main" name="Office Theme">
   <a:themeElements>

</xml_diff>

<commit_message>
First sub-function, mock-up updated
</commit_message>
<xml_diff>
--- a/docs/icons.pptx
+++ b/docs/icons.pptx
@@ -8,6 +8,7 @@
     <p:sldId id="256" r:id="rId2"/>
     <p:sldId id="257" r:id="rId3"/>
     <p:sldId id="258" r:id="rId4"/>
+    <p:sldId id="259" r:id="rId5"/>
   </p:sldIdLst>
   <p:sldSz cx="12192000" cy="6858000"/>
   <p:notesSz cx="6858000" cy="9144000"/>
@@ -4618,6 +4619,252 @@
 </p:sld>
 </file>
 
+<file path=ppt/slides/slide4.xml><?xml version="1.0" encoding="utf-8"?>
+<p:sld xmlns:a="http://schemas.openxmlformats.org/drawingml/2006/main" xmlns:r="http://schemas.openxmlformats.org/officeDocument/2006/relationships" xmlns:p="http://schemas.openxmlformats.org/presentationml/2006/main">
+  <p:cSld>
+    <p:spTree>
+      <p:nvGrpSpPr>
+        <p:cNvPr id="1" name=""/>
+        <p:cNvGrpSpPr/>
+        <p:nvPr/>
+      </p:nvGrpSpPr>
+      <p:grpSpPr>
+        <a:xfrm>
+          <a:off x="0" y="0"/>
+          <a:ext cx="0" cy="0"/>
+          <a:chOff x="0" y="0"/>
+          <a:chExt cx="0" cy="0"/>
+        </a:xfrm>
+      </p:grpSpPr>
+      <p:sp>
+        <p:nvSpPr>
+          <p:cNvPr id="4" name="Rectangle 3">
+            <a:extLst>
+              <a:ext uri="{FF2B5EF4-FFF2-40B4-BE49-F238E27FC236}">
+                <a16:creationId xmlns:a16="http://schemas.microsoft.com/office/drawing/2014/main" id="{F45DCEE9-4AB0-4E22-A6B7-062AA89DED99}"/>
+              </a:ext>
+            </a:extLst>
+          </p:cNvPr>
+          <p:cNvSpPr/>
+          <p:nvPr/>
+        </p:nvSpPr>
+        <p:spPr>
+          <a:xfrm>
+            <a:off x="3622090" y="2401409"/>
+            <a:ext cx="762000" cy="152400"/>
+          </a:xfrm>
+          <a:prstGeom prst="rect">
+            <a:avLst/>
+          </a:prstGeom>
+          <a:solidFill>
+            <a:srgbClr val="FFA500"/>
+          </a:solidFill>
+          <a:ln>
+            <a:solidFill>
+              <a:srgbClr val="FFA500"/>
+            </a:solidFill>
+          </a:ln>
+        </p:spPr>
+        <p:style>
+          <a:lnRef idx="2">
+            <a:schemeClr val="accent1">
+              <a:shade val="50000"/>
+            </a:schemeClr>
+          </a:lnRef>
+          <a:fillRef idx="1">
+            <a:schemeClr val="accent1"/>
+          </a:fillRef>
+          <a:effectRef idx="0">
+            <a:schemeClr val="accent1"/>
+          </a:effectRef>
+          <a:fontRef idx="minor">
+            <a:schemeClr val="lt1"/>
+          </a:fontRef>
+        </p:style>
+        <p:txBody>
+          <a:bodyPr rtlCol="0" anchor="ctr"/>
+          <a:lstStyle/>
+          <a:p>
+            <a:pPr algn="ctr"/>
+            <a:endParaRPr lang="en-US"/>
+          </a:p>
+        </p:txBody>
+      </p:sp>
+      <p:sp>
+        <p:nvSpPr>
+          <p:cNvPr id="5" name="Oval 4">
+            <a:extLst>
+              <a:ext uri="{FF2B5EF4-FFF2-40B4-BE49-F238E27FC236}">
+                <a16:creationId xmlns:a16="http://schemas.microsoft.com/office/drawing/2014/main" id="{EDC55A6E-2932-41A7-AE7D-F34B60BD798C}"/>
+              </a:ext>
+            </a:extLst>
+          </p:cNvPr>
+          <p:cNvSpPr/>
+          <p:nvPr/>
+        </p:nvSpPr>
+        <p:spPr>
+          <a:xfrm>
+            <a:off x="3964990" y="2439509"/>
+            <a:ext cx="76200" cy="76200"/>
+          </a:xfrm>
+          <a:prstGeom prst="ellipse">
+            <a:avLst/>
+          </a:prstGeom>
+          <a:solidFill>
+            <a:schemeClr val="bg1"/>
+          </a:solidFill>
+          <a:ln>
+            <a:solidFill>
+              <a:schemeClr val="bg1"/>
+            </a:solidFill>
+          </a:ln>
+        </p:spPr>
+        <p:style>
+          <a:lnRef idx="2">
+            <a:schemeClr val="accent1">
+              <a:shade val="50000"/>
+            </a:schemeClr>
+          </a:lnRef>
+          <a:fillRef idx="1">
+            <a:schemeClr val="accent1"/>
+          </a:fillRef>
+          <a:effectRef idx="0">
+            <a:schemeClr val="accent1"/>
+          </a:effectRef>
+          <a:fontRef idx="minor">
+            <a:schemeClr val="lt1"/>
+          </a:fontRef>
+        </p:style>
+        <p:txBody>
+          <a:bodyPr rtlCol="0" anchor="ctr"/>
+          <a:lstStyle/>
+          <a:p>
+            <a:pPr algn="ctr"/>
+            <a:endParaRPr lang="en-US"/>
+          </a:p>
+        </p:txBody>
+      </p:sp>
+      <p:sp>
+        <p:nvSpPr>
+          <p:cNvPr id="6" name="Oval 5">
+            <a:extLst>
+              <a:ext uri="{FF2B5EF4-FFF2-40B4-BE49-F238E27FC236}">
+                <a16:creationId xmlns:a16="http://schemas.microsoft.com/office/drawing/2014/main" id="{757EFE42-9C03-4C38-82B8-4CE773D95134}"/>
+              </a:ext>
+            </a:extLst>
+          </p:cNvPr>
+          <p:cNvSpPr/>
+          <p:nvPr/>
+        </p:nvSpPr>
+        <p:spPr>
+          <a:xfrm>
+            <a:off x="4174540" y="2439509"/>
+            <a:ext cx="76200" cy="76200"/>
+          </a:xfrm>
+          <a:prstGeom prst="ellipse">
+            <a:avLst/>
+          </a:prstGeom>
+          <a:solidFill>
+            <a:schemeClr val="bg1"/>
+          </a:solidFill>
+          <a:ln>
+            <a:solidFill>
+              <a:schemeClr val="bg1"/>
+            </a:solidFill>
+          </a:ln>
+        </p:spPr>
+        <p:style>
+          <a:lnRef idx="2">
+            <a:schemeClr val="accent1">
+              <a:shade val="50000"/>
+            </a:schemeClr>
+          </a:lnRef>
+          <a:fillRef idx="1">
+            <a:schemeClr val="accent1"/>
+          </a:fillRef>
+          <a:effectRef idx="0">
+            <a:schemeClr val="accent1"/>
+          </a:effectRef>
+          <a:fontRef idx="minor">
+            <a:schemeClr val="lt1"/>
+          </a:fontRef>
+        </p:style>
+        <p:txBody>
+          <a:bodyPr rtlCol="0" anchor="ctr"/>
+          <a:lstStyle/>
+          <a:p>
+            <a:pPr algn="ctr"/>
+            <a:endParaRPr lang="en-US"/>
+          </a:p>
+        </p:txBody>
+      </p:sp>
+      <p:sp>
+        <p:nvSpPr>
+          <p:cNvPr id="7" name="Oval 6">
+            <a:extLst>
+              <a:ext uri="{FF2B5EF4-FFF2-40B4-BE49-F238E27FC236}">
+                <a16:creationId xmlns:a16="http://schemas.microsoft.com/office/drawing/2014/main" id="{95E72654-900A-4B96-A592-A5C0C94A8F5C}"/>
+              </a:ext>
+            </a:extLst>
+          </p:cNvPr>
+          <p:cNvSpPr/>
+          <p:nvPr/>
+        </p:nvSpPr>
+        <p:spPr>
+          <a:xfrm>
+            <a:off x="3755440" y="2439509"/>
+            <a:ext cx="76200" cy="76200"/>
+          </a:xfrm>
+          <a:prstGeom prst="ellipse">
+            <a:avLst/>
+          </a:prstGeom>
+          <a:solidFill>
+            <a:schemeClr val="bg1"/>
+          </a:solidFill>
+          <a:ln>
+            <a:solidFill>
+              <a:schemeClr val="bg1"/>
+            </a:solidFill>
+          </a:ln>
+        </p:spPr>
+        <p:style>
+          <a:lnRef idx="2">
+            <a:schemeClr val="accent1">
+              <a:shade val="50000"/>
+            </a:schemeClr>
+          </a:lnRef>
+          <a:fillRef idx="1">
+            <a:schemeClr val="accent1"/>
+          </a:fillRef>
+          <a:effectRef idx="0">
+            <a:schemeClr val="accent1"/>
+          </a:effectRef>
+          <a:fontRef idx="minor">
+            <a:schemeClr val="lt1"/>
+          </a:fontRef>
+        </p:style>
+        <p:txBody>
+          <a:bodyPr rtlCol="0" anchor="ctr"/>
+          <a:lstStyle/>
+          <a:p>
+            <a:pPr algn="ctr"/>
+            <a:endParaRPr lang="en-US"/>
+          </a:p>
+        </p:txBody>
+      </p:sp>
+    </p:spTree>
+    <p:extLst>
+      <p:ext uri="{BB962C8B-B14F-4D97-AF65-F5344CB8AC3E}">
+        <p14:creationId xmlns:p14="http://schemas.microsoft.com/office/powerpoint/2010/main" val="342802701"/>
+      </p:ext>
+    </p:extLst>
+  </p:cSld>
+  <p:clrMapOvr>
+    <a:masterClrMapping/>
+  </p:clrMapOvr>
+</p:sld>
+</file>
+
 <file path=ppt/theme/theme1.xml><?xml version="1.0" encoding="utf-8"?>
 <a:theme xmlns:a="http://schemas.openxmlformats.org/drawingml/2006/main" name="Office Theme">
   <a:themeElements>

</xml_diff>

<commit_message>
Second sub-function, adjustement of the display (icons & buttons) and creation of the sub-classes
</commit_message>
<xml_diff>
--- a/docs/icons.pptx
+++ b/docs/icons.pptx
@@ -9,6 +9,7 @@
     <p:sldId id="257" r:id="rId3"/>
     <p:sldId id="258" r:id="rId4"/>
     <p:sldId id="259" r:id="rId5"/>
+    <p:sldId id="260" r:id="rId6"/>
   </p:sldIdLst>
   <p:sldSz cx="12192000" cy="6858000"/>
   <p:notesSz cx="6858000" cy="9144000"/>
@@ -262,7 +263,7 @@
           <a:p>
             <a:fld id="{FD00C4DA-C7B8-4A22-9C82-0DEE3AFE6205}" type="datetimeFigureOut">
               <a:rPr lang="en-US" smtClean="0"/>
-              <a:t>3/9/2021</a:t>
+              <a:t>3/10/2021</a:t>
             </a:fld>
             <a:endParaRPr lang="en-US"/>
           </a:p>
@@ -460,7 +461,7 @@
           <a:p>
             <a:fld id="{FD00C4DA-C7B8-4A22-9C82-0DEE3AFE6205}" type="datetimeFigureOut">
               <a:rPr lang="en-US" smtClean="0"/>
-              <a:t>3/9/2021</a:t>
+              <a:t>3/10/2021</a:t>
             </a:fld>
             <a:endParaRPr lang="en-US"/>
           </a:p>
@@ -668,7 +669,7 @@
           <a:p>
             <a:fld id="{FD00C4DA-C7B8-4A22-9C82-0DEE3AFE6205}" type="datetimeFigureOut">
               <a:rPr lang="en-US" smtClean="0"/>
-              <a:t>3/9/2021</a:t>
+              <a:t>3/10/2021</a:t>
             </a:fld>
             <a:endParaRPr lang="en-US"/>
           </a:p>
@@ -866,7 +867,7 @@
           <a:p>
             <a:fld id="{FD00C4DA-C7B8-4A22-9C82-0DEE3AFE6205}" type="datetimeFigureOut">
               <a:rPr lang="en-US" smtClean="0"/>
-              <a:t>3/9/2021</a:t>
+              <a:t>3/10/2021</a:t>
             </a:fld>
             <a:endParaRPr lang="en-US"/>
           </a:p>
@@ -1141,7 +1142,7 @@
           <a:p>
             <a:fld id="{FD00C4DA-C7B8-4A22-9C82-0DEE3AFE6205}" type="datetimeFigureOut">
               <a:rPr lang="en-US" smtClean="0"/>
-              <a:t>3/9/2021</a:t>
+              <a:t>3/10/2021</a:t>
             </a:fld>
             <a:endParaRPr lang="en-US"/>
           </a:p>
@@ -1406,7 +1407,7 @@
           <a:p>
             <a:fld id="{FD00C4DA-C7B8-4A22-9C82-0DEE3AFE6205}" type="datetimeFigureOut">
               <a:rPr lang="en-US" smtClean="0"/>
-              <a:t>3/9/2021</a:t>
+              <a:t>3/10/2021</a:t>
             </a:fld>
             <a:endParaRPr lang="en-US"/>
           </a:p>
@@ -1818,7 +1819,7 @@
           <a:p>
             <a:fld id="{FD00C4DA-C7B8-4A22-9C82-0DEE3AFE6205}" type="datetimeFigureOut">
               <a:rPr lang="en-US" smtClean="0"/>
-              <a:t>3/9/2021</a:t>
+              <a:t>3/10/2021</a:t>
             </a:fld>
             <a:endParaRPr lang="en-US"/>
           </a:p>
@@ -1959,7 +1960,7 @@
           <a:p>
             <a:fld id="{FD00C4DA-C7B8-4A22-9C82-0DEE3AFE6205}" type="datetimeFigureOut">
               <a:rPr lang="en-US" smtClean="0"/>
-              <a:t>3/9/2021</a:t>
+              <a:t>3/10/2021</a:t>
             </a:fld>
             <a:endParaRPr lang="en-US"/>
           </a:p>
@@ -2072,7 +2073,7 @@
           <a:p>
             <a:fld id="{FD00C4DA-C7B8-4A22-9C82-0DEE3AFE6205}" type="datetimeFigureOut">
               <a:rPr lang="en-US" smtClean="0"/>
-              <a:t>3/9/2021</a:t>
+              <a:t>3/10/2021</a:t>
             </a:fld>
             <a:endParaRPr lang="en-US"/>
           </a:p>
@@ -2383,7 +2384,7 @@
           <a:p>
             <a:fld id="{FD00C4DA-C7B8-4A22-9C82-0DEE3AFE6205}" type="datetimeFigureOut">
               <a:rPr lang="en-US" smtClean="0"/>
-              <a:t>3/9/2021</a:t>
+              <a:t>3/10/2021</a:t>
             </a:fld>
             <a:endParaRPr lang="en-US"/>
           </a:p>
@@ -2671,7 +2672,7 @@
           <a:p>
             <a:fld id="{FD00C4DA-C7B8-4A22-9C82-0DEE3AFE6205}" type="datetimeFigureOut">
               <a:rPr lang="en-US" smtClean="0"/>
-              <a:t>3/9/2021</a:t>
+              <a:t>3/10/2021</a:t>
             </a:fld>
             <a:endParaRPr lang="en-US"/>
           </a:p>
@@ -2912,7 +2913,7 @@
           <a:p>
             <a:fld id="{FD00C4DA-C7B8-4A22-9C82-0DEE3AFE6205}" type="datetimeFigureOut">
               <a:rPr lang="en-US" smtClean="0"/>
-              <a:t>3/9/2021</a:t>
+              <a:t>3/10/2021</a:t>
             </a:fld>
             <a:endParaRPr lang="en-US"/>
           </a:p>
@@ -4852,10 +4853,419 @@
           </a:p>
         </p:txBody>
       </p:sp>
+      <p:pic>
+        <p:nvPicPr>
+          <p:cNvPr id="3" name="Picture 2" descr="Icon&#10;&#10;Description automatically generated">
+            <a:extLst>
+              <a:ext uri="{FF2B5EF4-FFF2-40B4-BE49-F238E27FC236}">
+                <a16:creationId xmlns:a16="http://schemas.microsoft.com/office/drawing/2014/main" id="{68B1F76E-709A-439A-B33A-2E9C4FA5166D}"/>
+              </a:ext>
+            </a:extLst>
+          </p:cNvPr>
+          <p:cNvPicPr>
+            <a:picLocks noChangeAspect="1"/>
+          </p:cNvPicPr>
+          <p:nvPr/>
+        </p:nvPicPr>
+        <p:blipFill>
+          <a:blip r:embed="rId2">
+            <a:extLst>
+              <a:ext uri="{28A0092B-C50C-407E-A947-70E740481C1C}">
+                <a14:useLocalDpi xmlns:a14="http://schemas.microsoft.com/office/drawing/2010/main" val="0"/>
+              </a:ext>
+            </a:extLst>
+          </a:blip>
+          <a:stretch>
+            <a:fillRect/>
+          </a:stretch>
+        </p:blipFill>
+        <p:spPr>
+          <a:xfrm>
+            <a:off x="11430000" y="313662"/>
+            <a:ext cx="762000" cy="163689"/>
+          </a:xfrm>
+          <a:prstGeom prst="rect">
+            <a:avLst/>
+          </a:prstGeom>
+        </p:spPr>
+      </p:pic>
+      <p:sp>
+        <p:nvSpPr>
+          <p:cNvPr id="8" name="Rectangle 7">
+            <a:extLst>
+              <a:ext uri="{FF2B5EF4-FFF2-40B4-BE49-F238E27FC236}">
+                <a16:creationId xmlns:a16="http://schemas.microsoft.com/office/drawing/2014/main" id="{558D0DC5-86FE-4EF3-A3B3-58EC9D4E0C78}"/>
+              </a:ext>
+            </a:extLst>
+          </p:cNvPr>
+          <p:cNvSpPr/>
+          <p:nvPr/>
+        </p:nvSpPr>
+        <p:spPr>
+          <a:xfrm>
+            <a:off x="4775152" y="2496820"/>
+            <a:ext cx="2286000" cy="685800"/>
+          </a:xfrm>
+          <a:prstGeom prst="rect">
+            <a:avLst/>
+          </a:prstGeom>
+          <a:solidFill>
+            <a:srgbClr val="FFA500"/>
+          </a:solidFill>
+          <a:ln>
+            <a:solidFill>
+              <a:schemeClr val="bg1"/>
+            </a:solidFill>
+          </a:ln>
+        </p:spPr>
+        <p:style>
+          <a:lnRef idx="2">
+            <a:schemeClr val="accent1">
+              <a:shade val="50000"/>
+            </a:schemeClr>
+          </a:lnRef>
+          <a:fillRef idx="1">
+            <a:schemeClr val="accent1"/>
+          </a:fillRef>
+          <a:effectRef idx="0">
+            <a:schemeClr val="accent1"/>
+          </a:effectRef>
+          <a:fontRef idx="minor">
+            <a:schemeClr val="lt1"/>
+          </a:fontRef>
+        </p:style>
+        <p:txBody>
+          <a:bodyPr rtlCol="0" anchor="ctr"/>
+          <a:lstStyle/>
+          <a:p>
+            <a:pPr algn="ctr"/>
+            <a:endParaRPr lang="en-US" dirty="0"/>
+          </a:p>
+        </p:txBody>
+      </p:sp>
+      <p:sp>
+        <p:nvSpPr>
+          <p:cNvPr id="10" name="Oval 9">
+            <a:extLst>
+              <a:ext uri="{FF2B5EF4-FFF2-40B4-BE49-F238E27FC236}">
+                <a16:creationId xmlns:a16="http://schemas.microsoft.com/office/drawing/2014/main" id="{E87C9C71-B395-42BD-95C2-A821B2CF1402}"/>
+              </a:ext>
+            </a:extLst>
+          </p:cNvPr>
+          <p:cNvSpPr/>
+          <p:nvPr/>
+        </p:nvSpPr>
+        <p:spPr>
+          <a:xfrm>
+            <a:off x="5803852" y="2725420"/>
+            <a:ext cx="228600" cy="228600"/>
+          </a:xfrm>
+          <a:prstGeom prst="ellipse">
+            <a:avLst/>
+          </a:prstGeom>
+          <a:solidFill>
+            <a:srgbClr val="FFFFFF"/>
+          </a:solidFill>
+          <a:ln>
+            <a:solidFill>
+              <a:schemeClr val="bg1"/>
+            </a:solidFill>
+          </a:ln>
+        </p:spPr>
+        <p:style>
+          <a:lnRef idx="2">
+            <a:schemeClr val="accent1">
+              <a:shade val="50000"/>
+            </a:schemeClr>
+          </a:lnRef>
+          <a:fillRef idx="1">
+            <a:schemeClr val="accent1"/>
+          </a:fillRef>
+          <a:effectRef idx="0">
+            <a:schemeClr val="accent1"/>
+          </a:effectRef>
+          <a:fontRef idx="minor">
+            <a:schemeClr val="lt1"/>
+          </a:fontRef>
+        </p:style>
+        <p:txBody>
+          <a:bodyPr rtlCol="0" anchor="ctr"/>
+          <a:lstStyle/>
+          <a:p>
+            <a:pPr algn="ctr"/>
+            <a:endParaRPr lang="en-US"/>
+          </a:p>
+        </p:txBody>
+      </p:sp>
+      <p:sp>
+        <p:nvSpPr>
+          <p:cNvPr id="11" name="Oval 10">
+            <a:extLst>
+              <a:ext uri="{FF2B5EF4-FFF2-40B4-BE49-F238E27FC236}">
+                <a16:creationId xmlns:a16="http://schemas.microsoft.com/office/drawing/2014/main" id="{5BD69DED-1E25-45AF-8228-A96F1B795CBC}"/>
+              </a:ext>
+            </a:extLst>
+          </p:cNvPr>
+          <p:cNvSpPr/>
+          <p:nvPr/>
+        </p:nvSpPr>
+        <p:spPr>
+          <a:xfrm>
+            <a:off x="5175202" y="2725420"/>
+            <a:ext cx="228600" cy="228600"/>
+          </a:xfrm>
+          <a:prstGeom prst="ellipse">
+            <a:avLst/>
+          </a:prstGeom>
+          <a:solidFill>
+            <a:srgbClr val="FFFFFF"/>
+          </a:solidFill>
+          <a:ln>
+            <a:solidFill>
+              <a:schemeClr val="bg1"/>
+            </a:solidFill>
+          </a:ln>
+        </p:spPr>
+        <p:style>
+          <a:lnRef idx="2">
+            <a:schemeClr val="accent1">
+              <a:shade val="50000"/>
+            </a:schemeClr>
+          </a:lnRef>
+          <a:fillRef idx="1">
+            <a:schemeClr val="accent1"/>
+          </a:fillRef>
+          <a:effectRef idx="0">
+            <a:schemeClr val="accent1"/>
+          </a:effectRef>
+          <a:fontRef idx="minor">
+            <a:schemeClr val="lt1"/>
+          </a:fontRef>
+        </p:style>
+        <p:txBody>
+          <a:bodyPr rtlCol="0" anchor="ctr"/>
+          <a:lstStyle/>
+          <a:p>
+            <a:pPr algn="ctr"/>
+            <a:endParaRPr lang="en-US"/>
+          </a:p>
+        </p:txBody>
+      </p:sp>
+      <p:sp>
+        <p:nvSpPr>
+          <p:cNvPr id="12" name="Oval 11">
+            <a:extLst>
+              <a:ext uri="{FF2B5EF4-FFF2-40B4-BE49-F238E27FC236}">
+                <a16:creationId xmlns:a16="http://schemas.microsoft.com/office/drawing/2014/main" id="{6F58DB65-2633-4B9C-9E56-A8ADC4F80D20}"/>
+              </a:ext>
+            </a:extLst>
+          </p:cNvPr>
+          <p:cNvSpPr/>
+          <p:nvPr/>
+        </p:nvSpPr>
+        <p:spPr>
+          <a:xfrm>
+            <a:off x="6432502" y="2725420"/>
+            <a:ext cx="228600" cy="228600"/>
+          </a:xfrm>
+          <a:prstGeom prst="ellipse">
+            <a:avLst/>
+          </a:prstGeom>
+          <a:solidFill>
+            <a:srgbClr val="FFFFFF"/>
+          </a:solidFill>
+          <a:ln>
+            <a:solidFill>
+              <a:schemeClr val="bg1"/>
+            </a:solidFill>
+          </a:ln>
+        </p:spPr>
+        <p:style>
+          <a:lnRef idx="2">
+            <a:schemeClr val="accent1">
+              <a:shade val="50000"/>
+            </a:schemeClr>
+          </a:lnRef>
+          <a:fillRef idx="1">
+            <a:schemeClr val="accent1"/>
+          </a:fillRef>
+          <a:effectRef idx="0">
+            <a:schemeClr val="accent1"/>
+          </a:effectRef>
+          <a:fontRef idx="minor">
+            <a:schemeClr val="lt1"/>
+          </a:fontRef>
+        </p:style>
+        <p:txBody>
+          <a:bodyPr rtlCol="0" anchor="ctr"/>
+          <a:lstStyle/>
+          <a:p>
+            <a:pPr algn="ctr"/>
+            <a:endParaRPr lang="en-US"/>
+          </a:p>
+        </p:txBody>
+      </p:sp>
     </p:spTree>
     <p:extLst>
       <p:ext uri="{BB962C8B-B14F-4D97-AF65-F5344CB8AC3E}">
         <p14:creationId xmlns:p14="http://schemas.microsoft.com/office/powerpoint/2010/main" val="342802701"/>
+      </p:ext>
+    </p:extLst>
+  </p:cSld>
+  <p:clrMapOvr>
+    <a:masterClrMapping/>
+  </p:clrMapOvr>
+</p:sld>
+</file>
+
+<file path=ppt/slides/slide5.xml><?xml version="1.0" encoding="utf-8"?>
+<p:sld xmlns:a="http://schemas.openxmlformats.org/drawingml/2006/main" xmlns:r="http://schemas.openxmlformats.org/officeDocument/2006/relationships" xmlns:p="http://schemas.openxmlformats.org/presentationml/2006/main">
+  <p:cSld>
+    <p:spTree>
+      <p:nvGrpSpPr>
+        <p:cNvPr id="1" name=""/>
+        <p:cNvGrpSpPr/>
+        <p:nvPr/>
+      </p:nvGrpSpPr>
+      <p:grpSpPr>
+        <a:xfrm>
+          <a:off x="0" y="0"/>
+          <a:ext cx="0" cy="0"/>
+          <a:chOff x="0" y="0"/>
+          <a:chExt cx="0" cy="0"/>
+        </a:xfrm>
+      </p:grpSpPr>
+      <p:grpSp>
+        <p:nvGrpSpPr>
+          <p:cNvPr id="6" name="Group 5">
+            <a:extLst>
+              <a:ext uri="{FF2B5EF4-FFF2-40B4-BE49-F238E27FC236}">
+                <a16:creationId xmlns:a16="http://schemas.microsoft.com/office/drawing/2014/main" id="{DF1FDA6C-5388-415E-A2A6-60F0F6B8E748}"/>
+              </a:ext>
+            </a:extLst>
+          </p:cNvPr>
+          <p:cNvGrpSpPr/>
+          <p:nvPr/>
+        </p:nvGrpSpPr>
+        <p:grpSpPr>
+          <a:xfrm>
+            <a:off x="3771900" y="1676400"/>
+            <a:ext cx="1524000" cy="1524000"/>
+            <a:chOff x="3771900" y="1676400"/>
+            <a:chExt cx="1524000" cy="1524000"/>
+          </a:xfrm>
+        </p:grpSpPr>
+        <p:sp>
+          <p:nvSpPr>
+            <p:cNvPr id="4" name="Rectangle 3">
+              <a:extLst>
+                <a:ext uri="{FF2B5EF4-FFF2-40B4-BE49-F238E27FC236}">
+                  <a16:creationId xmlns:a16="http://schemas.microsoft.com/office/drawing/2014/main" id="{26B51191-7FCE-424D-A045-E7022F0EB1B6}"/>
+                </a:ext>
+              </a:extLst>
+            </p:cNvPr>
+            <p:cNvSpPr/>
+            <p:nvPr/>
+          </p:nvSpPr>
+          <p:spPr>
+            <a:xfrm>
+              <a:off x="3771900" y="1676400"/>
+              <a:ext cx="1524000" cy="1524000"/>
+            </a:xfrm>
+            <a:prstGeom prst="rect">
+              <a:avLst/>
+            </a:prstGeom>
+            <a:solidFill>
+              <a:srgbClr val="FFA500"/>
+            </a:solidFill>
+            <a:ln>
+              <a:solidFill>
+                <a:srgbClr val="FFFFFF"/>
+              </a:solidFill>
+            </a:ln>
+          </p:spPr>
+          <p:style>
+            <a:lnRef idx="2">
+              <a:schemeClr val="accent1">
+                <a:shade val="50000"/>
+              </a:schemeClr>
+            </a:lnRef>
+            <a:fillRef idx="1">
+              <a:schemeClr val="accent1"/>
+            </a:fillRef>
+            <a:effectRef idx="0">
+              <a:schemeClr val="accent1"/>
+            </a:effectRef>
+            <a:fontRef idx="minor">
+              <a:schemeClr val="lt1"/>
+            </a:fontRef>
+          </p:style>
+          <p:txBody>
+            <a:bodyPr rtlCol="0" anchor="ctr"/>
+            <a:lstStyle/>
+            <a:p>
+              <a:pPr algn="ctr"/>
+              <a:endParaRPr lang="en-US"/>
+            </a:p>
+          </p:txBody>
+        </p:sp>
+        <p:sp>
+          <p:nvSpPr>
+            <p:cNvPr id="5" name="Arrow: Down 4">
+              <a:extLst>
+                <a:ext uri="{FF2B5EF4-FFF2-40B4-BE49-F238E27FC236}">
+                  <a16:creationId xmlns:a16="http://schemas.microsoft.com/office/drawing/2014/main" id="{626F931C-9085-4342-BE90-73BE4632D254}"/>
+                </a:ext>
+              </a:extLst>
+            </p:cNvPr>
+            <p:cNvSpPr/>
+            <p:nvPr/>
+          </p:nvSpPr>
+          <p:spPr>
+            <a:xfrm>
+              <a:off x="4000500" y="1800225"/>
+              <a:ext cx="1038225" cy="1276350"/>
+            </a:xfrm>
+            <a:prstGeom prst="downArrow">
+              <a:avLst/>
+            </a:prstGeom>
+            <a:solidFill>
+              <a:schemeClr val="bg1"/>
+            </a:solidFill>
+            <a:ln>
+              <a:noFill/>
+            </a:ln>
+          </p:spPr>
+          <p:style>
+            <a:lnRef idx="2">
+              <a:schemeClr val="accent1">
+                <a:shade val="50000"/>
+              </a:schemeClr>
+            </a:lnRef>
+            <a:fillRef idx="1">
+              <a:schemeClr val="accent1"/>
+            </a:fillRef>
+            <a:effectRef idx="0">
+              <a:schemeClr val="accent1"/>
+            </a:effectRef>
+            <a:fontRef idx="minor">
+              <a:schemeClr val="lt1"/>
+            </a:fontRef>
+          </p:style>
+          <p:txBody>
+            <a:bodyPr rtlCol="0" anchor="ctr"/>
+            <a:lstStyle/>
+            <a:p>
+              <a:pPr algn="ctr"/>
+              <a:endParaRPr lang="en-US"/>
+            </a:p>
+          </p:txBody>
+        </p:sp>
+      </p:grpSp>
+    </p:spTree>
+    <p:extLst>
+      <p:ext uri="{BB962C8B-B14F-4D97-AF65-F5344CB8AC3E}">
+        <p14:creationId xmlns:p14="http://schemas.microsoft.com/office/powerpoint/2010/main" val="3733100313"/>
       </p:ext>
     </p:extLst>
   </p:cSld>

</xml_diff>

<commit_message>
Details modified/adjuted, most of icons added
</commit_message>
<xml_diff>
--- a/docs/icons.pptx
+++ b/docs/icons.pptx
@@ -10,6 +10,8 @@
     <p:sldId id="258" r:id="rId4"/>
     <p:sldId id="259" r:id="rId5"/>
     <p:sldId id="260" r:id="rId6"/>
+    <p:sldId id="261" r:id="rId7"/>
+    <p:sldId id="262" r:id="rId8"/>
   </p:sldIdLst>
   <p:sldSz cx="12192000" cy="6858000"/>
   <p:notesSz cx="6858000" cy="9144000"/>
@@ -5149,7 +5151,7 @@
         </p:nvGrpSpPr>
         <p:grpSpPr>
           <a:xfrm>
-            <a:off x="3771900" y="1676400"/>
+            <a:off x="1064211" y="1401192"/>
             <a:ext cx="1524000" cy="1524000"/>
             <a:chOff x="3771900" y="1676400"/>
             <a:chExt cx="1524000" cy="1524000"/>
@@ -5262,10 +5264,1362 @@
           </p:txBody>
         </p:sp>
       </p:grpSp>
+      <p:grpSp>
+        <p:nvGrpSpPr>
+          <p:cNvPr id="21" name="Group 20">
+            <a:extLst>
+              <a:ext uri="{FF2B5EF4-FFF2-40B4-BE49-F238E27FC236}">
+                <a16:creationId xmlns:a16="http://schemas.microsoft.com/office/drawing/2014/main" id="{6E0BC22B-FAD0-4244-B082-A125797530D3}"/>
+              </a:ext>
+            </a:extLst>
+          </p:cNvPr>
+          <p:cNvGrpSpPr/>
+          <p:nvPr/>
+        </p:nvGrpSpPr>
+        <p:grpSpPr>
+          <a:xfrm>
+            <a:off x="5868990" y="1653133"/>
+            <a:ext cx="1524000" cy="1524000"/>
+            <a:chOff x="5868990" y="1653133"/>
+            <a:chExt cx="1524000" cy="1524000"/>
+          </a:xfrm>
+        </p:grpSpPr>
+        <p:sp>
+          <p:nvSpPr>
+            <p:cNvPr id="2" name="Rectangle 1">
+              <a:extLst>
+                <a:ext uri="{FF2B5EF4-FFF2-40B4-BE49-F238E27FC236}">
+                  <a16:creationId xmlns:a16="http://schemas.microsoft.com/office/drawing/2014/main" id="{0EA82253-C11F-445D-84CE-0B50F6DCC122}"/>
+                </a:ext>
+              </a:extLst>
+            </p:cNvPr>
+            <p:cNvSpPr/>
+            <p:nvPr/>
+          </p:nvSpPr>
+          <p:spPr>
+            <a:xfrm>
+              <a:off x="5868990" y="1653133"/>
+              <a:ext cx="1524000" cy="1524000"/>
+            </a:xfrm>
+            <a:prstGeom prst="rect">
+              <a:avLst/>
+            </a:prstGeom>
+            <a:solidFill>
+              <a:srgbClr val="FFA500"/>
+            </a:solidFill>
+            <a:ln>
+              <a:solidFill>
+                <a:schemeClr val="bg1"/>
+              </a:solidFill>
+            </a:ln>
+          </p:spPr>
+          <p:style>
+            <a:lnRef idx="2">
+              <a:schemeClr val="accent1">
+                <a:shade val="50000"/>
+              </a:schemeClr>
+            </a:lnRef>
+            <a:fillRef idx="1">
+              <a:schemeClr val="accent1"/>
+            </a:fillRef>
+            <a:effectRef idx="0">
+              <a:schemeClr val="accent1"/>
+            </a:effectRef>
+            <a:fontRef idx="minor">
+              <a:schemeClr val="lt1"/>
+            </a:fontRef>
+          </p:style>
+          <p:txBody>
+            <a:bodyPr rtlCol="0" anchor="ctr"/>
+            <a:lstStyle/>
+            <a:p>
+              <a:pPr algn="ctr"/>
+              <a:endParaRPr lang="en-US"/>
+            </a:p>
+          </p:txBody>
+        </p:sp>
+        <p:grpSp>
+          <p:nvGrpSpPr>
+            <p:cNvPr id="20" name="Group 19">
+              <a:extLst>
+                <a:ext uri="{FF2B5EF4-FFF2-40B4-BE49-F238E27FC236}">
+                  <a16:creationId xmlns:a16="http://schemas.microsoft.com/office/drawing/2014/main" id="{21699DF9-2099-448D-A3F6-E1E2731255C3}"/>
+                </a:ext>
+              </a:extLst>
+            </p:cNvPr>
+            <p:cNvGrpSpPr/>
+            <p:nvPr/>
+          </p:nvGrpSpPr>
+          <p:grpSpPr>
+            <a:xfrm>
+              <a:off x="6076879" y="1845297"/>
+              <a:ext cx="886019" cy="1072605"/>
+              <a:chOff x="6137839" y="1771669"/>
+              <a:chExt cx="886019" cy="1072605"/>
+            </a:xfrm>
+          </p:grpSpPr>
+          <p:sp>
+            <p:nvSpPr>
+              <p:cNvPr id="16" name="Isosceles Triangle 15">
+                <a:extLst>
+                  <a:ext uri="{FF2B5EF4-FFF2-40B4-BE49-F238E27FC236}">
+                    <a16:creationId xmlns:a16="http://schemas.microsoft.com/office/drawing/2014/main" id="{BEE34D88-EEB1-4E61-89FC-9ECAFDD62C99}"/>
+                  </a:ext>
+                </a:extLst>
+              </p:cNvPr>
+              <p:cNvSpPr/>
+              <p:nvPr/>
+            </p:nvSpPr>
+            <p:spPr>
+              <a:xfrm rot="10212482">
+                <a:off x="6565706" y="2665157"/>
+                <a:ext cx="279933" cy="179117"/>
+              </a:xfrm>
+              <a:prstGeom prst="triangle">
+                <a:avLst/>
+              </a:prstGeom>
+              <a:solidFill>
+                <a:schemeClr val="bg1"/>
+              </a:solidFill>
+              <a:ln>
+                <a:solidFill>
+                  <a:schemeClr val="bg1"/>
+                </a:solidFill>
+              </a:ln>
+            </p:spPr>
+            <p:style>
+              <a:lnRef idx="2">
+                <a:schemeClr val="accent1">
+                  <a:shade val="50000"/>
+                </a:schemeClr>
+              </a:lnRef>
+              <a:fillRef idx="1">
+                <a:schemeClr val="accent1"/>
+              </a:fillRef>
+              <a:effectRef idx="0">
+                <a:schemeClr val="accent1"/>
+              </a:effectRef>
+              <a:fontRef idx="minor">
+                <a:schemeClr val="lt1"/>
+              </a:fontRef>
+            </p:style>
+            <p:txBody>
+              <a:bodyPr rtlCol="0" anchor="ctr"/>
+              <a:lstStyle/>
+              <a:p>
+                <a:pPr algn="ctr"/>
+                <a:endParaRPr lang="en-US"/>
+              </a:p>
+            </p:txBody>
+          </p:sp>
+          <p:sp>
+            <p:nvSpPr>
+              <p:cNvPr id="17" name="Isosceles Triangle 16">
+                <a:extLst>
+                  <a:ext uri="{FF2B5EF4-FFF2-40B4-BE49-F238E27FC236}">
+                    <a16:creationId xmlns:a16="http://schemas.microsoft.com/office/drawing/2014/main" id="{F041B398-AC4D-43A2-9CAD-5B30D43A41E4}"/>
+                  </a:ext>
+                </a:extLst>
+              </p:cNvPr>
+              <p:cNvSpPr/>
+              <p:nvPr/>
+            </p:nvSpPr>
+            <p:spPr>
+              <a:xfrm rot="18575770">
+                <a:off x="6371150" y="2153774"/>
+                <a:ext cx="206557" cy="673179"/>
+              </a:xfrm>
+              <a:prstGeom prst="triangle">
+                <a:avLst>
+                  <a:gd name="adj" fmla="val 0"/>
+                </a:avLst>
+              </a:prstGeom>
+              <a:solidFill>
+                <a:schemeClr val="bg1"/>
+              </a:solidFill>
+              <a:ln>
+                <a:solidFill>
+                  <a:schemeClr val="bg1"/>
+                </a:solidFill>
+              </a:ln>
+            </p:spPr>
+            <p:style>
+              <a:lnRef idx="2">
+                <a:schemeClr val="accent1">
+                  <a:shade val="50000"/>
+                </a:schemeClr>
+              </a:lnRef>
+              <a:fillRef idx="1">
+                <a:schemeClr val="accent1"/>
+              </a:fillRef>
+              <a:effectRef idx="0">
+                <a:schemeClr val="accent1"/>
+              </a:effectRef>
+              <a:fontRef idx="minor">
+                <a:schemeClr val="lt1"/>
+              </a:fontRef>
+            </p:style>
+            <p:txBody>
+              <a:bodyPr rtlCol="0" anchor="ctr"/>
+              <a:lstStyle/>
+              <a:p>
+                <a:pPr algn="ctr"/>
+                <a:endParaRPr lang="en-US"/>
+              </a:p>
+            </p:txBody>
+          </p:sp>
+          <p:sp>
+            <p:nvSpPr>
+              <p:cNvPr id="19" name="Isosceles Triangle 18">
+                <a:extLst>
+                  <a:ext uri="{FF2B5EF4-FFF2-40B4-BE49-F238E27FC236}">
+                    <a16:creationId xmlns:a16="http://schemas.microsoft.com/office/drawing/2014/main" id="{AA003DD3-EABB-4662-996C-39AC0D02664A}"/>
+                  </a:ext>
+                </a:extLst>
+              </p:cNvPr>
+              <p:cNvSpPr/>
+              <p:nvPr/>
+            </p:nvSpPr>
+            <p:spPr>
+              <a:xfrm rot="1856451">
+                <a:off x="6779807" y="1771669"/>
+                <a:ext cx="244051" cy="1025200"/>
+              </a:xfrm>
+              <a:prstGeom prst="triangle">
+                <a:avLst>
+                  <a:gd name="adj" fmla="val 100000"/>
+                </a:avLst>
+              </a:prstGeom>
+              <a:solidFill>
+                <a:schemeClr val="bg1"/>
+              </a:solidFill>
+              <a:ln>
+                <a:solidFill>
+                  <a:schemeClr val="bg1"/>
+                </a:solidFill>
+              </a:ln>
+            </p:spPr>
+            <p:style>
+              <a:lnRef idx="2">
+                <a:schemeClr val="accent1">
+                  <a:shade val="50000"/>
+                </a:schemeClr>
+              </a:lnRef>
+              <a:fillRef idx="1">
+                <a:schemeClr val="accent1"/>
+              </a:fillRef>
+              <a:effectRef idx="0">
+                <a:schemeClr val="accent1"/>
+              </a:effectRef>
+              <a:fontRef idx="minor">
+                <a:schemeClr val="lt1"/>
+              </a:fontRef>
+            </p:style>
+            <p:txBody>
+              <a:bodyPr rtlCol="0" anchor="ctr"/>
+              <a:lstStyle/>
+              <a:p>
+                <a:pPr algn="ctr"/>
+                <a:endParaRPr lang="en-US"/>
+              </a:p>
+            </p:txBody>
+          </p:sp>
+        </p:grpSp>
+      </p:grpSp>
     </p:spTree>
     <p:extLst>
       <p:ext uri="{BB962C8B-B14F-4D97-AF65-F5344CB8AC3E}">
         <p14:creationId xmlns:p14="http://schemas.microsoft.com/office/powerpoint/2010/main" val="3733100313"/>
+      </p:ext>
+    </p:extLst>
+  </p:cSld>
+  <p:clrMapOvr>
+    <a:masterClrMapping/>
+  </p:clrMapOvr>
+</p:sld>
+</file>
+
+<file path=ppt/slides/slide6.xml><?xml version="1.0" encoding="utf-8"?>
+<p:sld xmlns:a="http://schemas.openxmlformats.org/drawingml/2006/main" xmlns:r="http://schemas.openxmlformats.org/officeDocument/2006/relationships" xmlns:p="http://schemas.openxmlformats.org/presentationml/2006/main">
+  <p:cSld>
+    <p:spTree>
+      <p:nvGrpSpPr>
+        <p:cNvPr id="1" name=""/>
+        <p:cNvGrpSpPr/>
+        <p:nvPr/>
+      </p:nvGrpSpPr>
+      <p:grpSpPr>
+        <a:xfrm>
+          <a:off x="0" y="0"/>
+          <a:ext cx="0" cy="0"/>
+          <a:chOff x="0" y="0"/>
+          <a:chExt cx="0" cy="0"/>
+        </a:xfrm>
+      </p:grpSpPr>
+      <p:grpSp>
+        <p:nvGrpSpPr>
+          <p:cNvPr id="6" name="Group 5">
+            <a:extLst>
+              <a:ext uri="{FF2B5EF4-FFF2-40B4-BE49-F238E27FC236}">
+                <a16:creationId xmlns:a16="http://schemas.microsoft.com/office/drawing/2014/main" id="{2C3EC089-B002-482F-9169-4DA2618D5CCC}"/>
+              </a:ext>
+            </a:extLst>
+          </p:cNvPr>
+          <p:cNvGrpSpPr/>
+          <p:nvPr/>
+        </p:nvGrpSpPr>
+        <p:grpSpPr>
+          <a:xfrm>
+            <a:off x="764540" y="1361440"/>
+            <a:ext cx="1524000" cy="1524000"/>
+            <a:chOff x="764540" y="1361440"/>
+            <a:chExt cx="1524000" cy="1524000"/>
+          </a:xfrm>
+        </p:grpSpPr>
+        <p:sp>
+          <p:nvSpPr>
+            <p:cNvPr id="4" name="Rectangle 3">
+              <a:extLst>
+                <a:ext uri="{FF2B5EF4-FFF2-40B4-BE49-F238E27FC236}">
+                  <a16:creationId xmlns:a16="http://schemas.microsoft.com/office/drawing/2014/main" id="{2B9CD8ED-4876-4544-8A6B-FAA7B9608F3B}"/>
+                </a:ext>
+              </a:extLst>
+            </p:cNvPr>
+            <p:cNvSpPr/>
+            <p:nvPr/>
+          </p:nvSpPr>
+          <p:spPr>
+            <a:xfrm>
+              <a:off x="764540" y="1361440"/>
+              <a:ext cx="1524000" cy="1524000"/>
+            </a:xfrm>
+            <a:prstGeom prst="rect">
+              <a:avLst/>
+            </a:prstGeom>
+            <a:solidFill>
+              <a:srgbClr val="FFA500"/>
+            </a:solidFill>
+            <a:ln>
+              <a:solidFill>
+                <a:schemeClr val="bg1"/>
+              </a:solidFill>
+            </a:ln>
+          </p:spPr>
+          <p:style>
+            <a:lnRef idx="2">
+              <a:schemeClr val="accent1">
+                <a:shade val="50000"/>
+              </a:schemeClr>
+            </a:lnRef>
+            <a:fillRef idx="1">
+              <a:schemeClr val="accent1"/>
+            </a:fillRef>
+            <a:effectRef idx="0">
+              <a:schemeClr val="accent1"/>
+            </a:effectRef>
+            <a:fontRef idx="minor">
+              <a:schemeClr val="lt1"/>
+            </a:fontRef>
+          </p:style>
+          <p:txBody>
+            <a:bodyPr rtlCol="0" anchor="ctr"/>
+            <a:lstStyle/>
+            <a:p>
+              <a:pPr algn="ctr"/>
+              <a:endParaRPr lang="en-US"/>
+            </a:p>
+          </p:txBody>
+        </p:sp>
+        <p:sp>
+          <p:nvSpPr>
+            <p:cNvPr id="5" name="Arrow: Curved Left 4">
+              <a:extLst>
+                <a:ext uri="{FF2B5EF4-FFF2-40B4-BE49-F238E27FC236}">
+                  <a16:creationId xmlns:a16="http://schemas.microsoft.com/office/drawing/2014/main" id="{22F92986-9B28-451F-B62E-4B0DA36526D6}"/>
+                </a:ext>
+              </a:extLst>
+            </p:cNvPr>
+            <p:cNvSpPr/>
+            <p:nvPr/>
+          </p:nvSpPr>
+          <p:spPr>
+            <a:xfrm>
+              <a:off x="1143000" y="1743710"/>
+              <a:ext cx="762000" cy="762000"/>
+            </a:xfrm>
+            <a:prstGeom prst="curvedLeftArrow">
+              <a:avLst/>
+            </a:prstGeom>
+            <a:solidFill>
+              <a:srgbClr val="FF9933"/>
+            </a:solidFill>
+            <a:ln>
+              <a:solidFill>
+                <a:schemeClr val="bg1"/>
+              </a:solidFill>
+            </a:ln>
+          </p:spPr>
+          <p:style>
+            <a:lnRef idx="2">
+              <a:schemeClr val="accent1">
+                <a:shade val="50000"/>
+              </a:schemeClr>
+            </a:lnRef>
+            <a:fillRef idx="1">
+              <a:schemeClr val="accent1"/>
+            </a:fillRef>
+            <a:effectRef idx="0">
+              <a:schemeClr val="accent1"/>
+            </a:effectRef>
+            <a:fontRef idx="minor">
+              <a:schemeClr val="lt1"/>
+            </a:fontRef>
+          </p:style>
+          <p:txBody>
+            <a:bodyPr rtlCol="0" anchor="ctr"/>
+            <a:lstStyle/>
+            <a:p>
+              <a:pPr algn="ctr"/>
+              <a:endParaRPr lang="en-US">
+                <a:solidFill>
+                  <a:schemeClr val="tx1"/>
+                </a:solidFill>
+              </a:endParaRPr>
+            </a:p>
+          </p:txBody>
+        </p:sp>
+      </p:grpSp>
+      <p:grpSp>
+        <p:nvGrpSpPr>
+          <p:cNvPr id="51" name="Group 50">
+            <a:extLst>
+              <a:ext uri="{FF2B5EF4-FFF2-40B4-BE49-F238E27FC236}">
+                <a16:creationId xmlns:a16="http://schemas.microsoft.com/office/drawing/2014/main" id="{37F5ADA5-5EA6-42E9-8A67-CE75F3FC8473}"/>
+              </a:ext>
+            </a:extLst>
+          </p:cNvPr>
+          <p:cNvGrpSpPr/>
+          <p:nvPr/>
+        </p:nvGrpSpPr>
+        <p:grpSpPr>
+          <a:xfrm>
+            <a:off x="4994656" y="1524000"/>
+            <a:ext cx="3810000" cy="3810000"/>
+            <a:chOff x="4994656" y="1524000"/>
+            <a:chExt cx="3810000" cy="3810000"/>
+          </a:xfrm>
+        </p:grpSpPr>
+        <p:sp>
+          <p:nvSpPr>
+            <p:cNvPr id="7" name="Rectangle 6">
+              <a:extLst>
+                <a:ext uri="{FF2B5EF4-FFF2-40B4-BE49-F238E27FC236}">
+                  <a16:creationId xmlns:a16="http://schemas.microsoft.com/office/drawing/2014/main" id="{FB807ED0-F222-4D3D-908F-7FE7BED75BFF}"/>
+                </a:ext>
+              </a:extLst>
+            </p:cNvPr>
+            <p:cNvSpPr/>
+            <p:nvPr/>
+          </p:nvSpPr>
+          <p:spPr>
+            <a:xfrm>
+              <a:off x="4994656" y="1524000"/>
+              <a:ext cx="3810000" cy="3810000"/>
+            </a:xfrm>
+            <a:prstGeom prst="rect">
+              <a:avLst/>
+            </a:prstGeom>
+            <a:solidFill>
+              <a:srgbClr val="FFA500"/>
+            </a:solidFill>
+            <a:ln>
+              <a:solidFill>
+                <a:schemeClr val="bg1"/>
+              </a:solidFill>
+            </a:ln>
+          </p:spPr>
+          <p:style>
+            <a:lnRef idx="2">
+              <a:schemeClr val="accent1">
+                <a:shade val="50000"/>
+              </a:schemeClr>
+            </a:lnRef>
+            <a:fillRef idx="1">
+              <a:schemeClr val="accent1"/>
+            </a:fillRef>
+            <a:effectRef idx="0">
+              <a:schemeClr val="accent1"/>
+            </a:effectRef>
+            <a:fontRef idx="minor">
+              <a:schemeClr val="lt1"/>
+            </a:fontRef>
+          </p:style>
+          <p:txBody>
+            <a:bodyPr rtlCol="0" anchor="ctr"/>
+            <a:lstStyle/>
+            <a:p>
+              <a:pPr algn="ctr"/>
+              <a:endParaRPr lang="en-US" dirty="0"/>
+            </a:p>
+          </p:txBody>
+        </p:sp>
+        <p:sp>
+          <p:nvSpPr>
+            <p:cNvPr id="8" name="Oval 7">
+              <a:extLst>
+                <a:ext uri="{FF2B5EF4-FFF2-40B4-BE49-F238E27FC236}">
+                  <a16:creationId xmlns:a16="http://schemas.microsoft.com/office/drawing/2014/main" id="{7C420693-8D34-48AE-B81A-F36F6E982876}"/>
+                </a:ext>
+              </a:extLst>
+            </p:cNvPr>
+            <p:cNvSpPr/>
+            <p:nvPr/>
+          </p:nvSpPr>
+          <p:spPr>
+            <a:xfrm>
+              <a:off x="5185156" y="1714500"/>
+              <a:ext cx="3429000" cy="3429000"/>
+            </a:xfrm>
+            <a:prstGeom prst="ellipse">
+              <a:avLst/>
+            </a:prstGeom>
+            <a:solidFill>
+              <a:srgbClr val="FFA500"/>
+            </a:solidFill>
+            <a:ln w="76200">
+              <a:solidFill>
+                <a:schemeClr val="bg1"/>
+              </a:solidFill>
+            </a:ln>
+          </p:spPr>
+          <p:style>
+            <a:lnRef idx="2">
+              <a:schemeClr val="accent1">
+                <a:shade val="50000"/>
+              </a:schemeClr>
+            </a:lnRef>
+            <a:fillRef idx="1">
+              <a:schemeClr val="accent1"/>
+            </a:fillRef>
+            <a:effectRef idx="0">
+              <a:schemeClr val="accent1"/>
+            </a:effectRef>
+            <a:fontRef idx="minor">
+              <a:schemeClr val="lt1"/>
+            </a:fontRef>
+          </p:style>
+          <p:txBody>
+            <a:bodyPr rtlCol="0" anchor="ctr"/>
+            <a:lstStyle/>
+            <a:p>
+              <a:pPr algn="ctr"/>
+              <a:endParaRPr lang="en-US"/>
+            </a:p>
+          </p:txBody>
+        </p:sp>
+        <p:cxnSp>
+          <p:nvCxnSpPr>
+            <p:cNvPr id="12" name="Straight Connector 11">
+              <a:extLst>
+                <a:ext uri="{FF2B5EF4-FFF2-40B4-BE49-F238E27FC236}">
+                  <a16:creationId xmlns:a16="http://schemas.microsoft.com/office/drawing/2014/main" id="{3A8350C8-525F-463C-9B91-56FB566CF2BB}"/>
+                </a:ext>
+              </a:extLst>
+            </p:cNvPr>
+            <p:cNvCxnSpPr>
+              <a:cxnSpLocks/>
+              <a:endCxn id="8" idx="4"/>
+            </p:cNvCxnSpPr>
+            <p:nvPr/>
+          </p:nvCxnSpPr>
+          <p:spPr>
+            <a:xfrm>
+              <a:off x="6899656" y="1743710"/>
+              <a:ext cx="0" cy="3399790"/>
+            </a:xfrm>
+            <a:prstGeom prst="line">
+              <a:avLst/>
+            </a:prstGeom>
+            <a:ln w="76200">
+              <a:solidFill>
+                <a:schemeClr val="bg1"/>
+              </a:solidFill>
+            </a:ln>
+          </p:spPr>
+          <p:style>
+            <a:lnRef idx="1">
+              <a:schemeClr val="accent1"/>
+            </a:lnRef>
+            <a:fillRef idx="0">
+              <a:schemeClr val="accent1"/>
+            </a:fillRef>
+            <a:effectRef idx="0">
+              <a:schemeClr val="accent1"/>
+            </a:effectRef>
+            <a:fontRef idx="minor">
+              <a:schemeClr val="tx1"/>
+            </a:fontRef>
+          </p:style>
+        </p:cxnSp>
+        <p:cxnSp>
+          <p:nvCxnSpPr>
+            <p:cNvPr id="14" name="Straight Connector 13">
+              <a:extLst>
+                <a:ext uri="{FF2B5EF4-FFF2-40B4-BE49-F238E27FC236}">
+                  <a16:creationId xmlns:a16="http://schemas.microsoft.com/office/drawing/2014/main" id="{638D4575-5BAB-4D5A-9985-F59B8C7573D9}"/>
+                </a:ext>
+              </a:extLst>
+            </p:cNvPr>
+            <p:cNvCxnSpPr>
+              <a:cxnSpLocks/>
+              <a:stCxn id="8" idx="2"/>
+              <a:endCxn id="8" idx="6"/>
+            </p:cNvCxnSpPr>
+            <p:nvPr/>
+          </p:nvCxnSpPr>
+          <p:spPr>
+            <a:xfrm>
+              <a:off x="5185156" y="3429000"/>
+              <a:ext cx="3429000" cy="0"/>
+            </a:xfrm>
+            <a:prstGeom prst="line">
+              <a:avLst/>
+            </a:prstGeom>
+            <a:ln w="76200">
+              <a:solidFill>
+                <a:schemeClr val="bg1"/>
+              </a:solidFill>
+            </a:ln>
+          </p:spPr>
+          <p:style>
+            <a:lnRef idx="1">
+              <a:schemeClr val="accent1"/>
+            </a:lnRef>
+            <a:fillRef idx="0">
+              <a:schemeClr val="accent1"/>
+            </a:fillRef>
+            <a:effectRef idx="0">
+              <a:schemeClr val="accent1"/>
+            </a:effectRef>
+            <a:fontRef idx="minor">
+              <a:schemeClr val="tx1"/>
+            </a:fontRef>
+          </p:style>
+        </p:cxnSp>
+        <p:cxnSp>
+          <p:nvCxnSpPr>
+            <p:cNvPr id="17" name="Straight Connector 16">
+              <a:extLst>
+                <a:ext uri="{FF2B5EF4-FFF2-40B4-BE49-F238E27FC236}">
+                  <a16:creationId xmlns:a16="http://schemas.microsoft.com/office/drawing/2014/main" id="{8707435F-C09C-4E12-8DBB-2AFBCAA85DE2}"/>
+                </a:ext>
+              </a:extLst>
+            </p:cNvPr>
+            <p:cNvCxnSpPr>
+              <a:cxnSpLocks/>
+              <a:stCxn id="8" idx="7"/>
+              <a:endCxn id="8" idx="3"/>
+            </p:cNvCxnSpPr>
+            <p:nvPr/>
+          </p:nvCxnSpPr>
+          <p:spPr>
+            <a:xfrm flipH="1">
+              <a:off x="5687321" y="2216665"/>
+              <a:ext cx="2424670" cy="2424670"/>
+            </a:xfrm>
+            <a:prstGeom prst="line">
+              <a:avLst/>
+            </a:prstGeom>
+            <a:ln w="76200">
+              <a:solidFill>
+                <a:schemeClr val="bg1"/>
+              </a:solidFill>
+            </a:ln>
+          </p:spPr>
+          <p:style>
+            <a:lnRef idx="1">
+              <a:schemeClr val="accent1"/>
+            </a:lnRef>
+            <a:fillRef idx="0">
+              <a:schemeClr val="accent1"/>
+            </a:fillRef>
+            <a:effectRef idx="0">
+              <a:schemeClr val="accent1"/>
+            </a:effectRef>
+            <a:fontRef idx="minor">
+              <a:schemeClr val="tx1"/>
+            </a:fontRef>
+          </p:style>
+        </p:cxnSp>
+        <p:cxnSp>
+          <p:nvCxnSpPr>
+            <p:cNvPr id="46" name="Straight Connector 45">
+              <a:extLst>
+                <a:ext uri="{FF2B5EF4-FFF2-40B4-BE49-F238E27FC236}">
+                  <a16:creationId xmlns:a16="http://schemas.microsoft.com/office/drawing/2014/main" id="{EF74D4EA-C656-4AC3-A3F0-C160BD02419E}"/>
+                </a:ext>
+              </a:extLst>
+            </p:cNvPr>
+            <p:cNvCxnSpPr>
+              <a:cxnSpLocks/>
+              <a:stCxn id="8" idx="1"/>
+              <a:endCxn id="8" idx="5"/>
+            </p:cNvCxnSpPr>
+            <p:nvPr/>
+          </p:nvCxnSpPr>
+          <p:spPr>
+            <a:xfrm>
+              <a:off x="5687321" y="2216665"/>
+              <a:ext cx="2424670" cy="2424670"/>
+            </a:xfrm>
+            <a:prstGeom prst="line">
+              <a:avLst/>
+            </a:prstGeom>
+            <a:ln w="76200">
+              <a:solidFill>
+                <a:schemeClr val="bg1"/>
+              </a:solidFill>
+            </a:ln>
+          </p:spPr>
+          <p:style>
+            <a:lnRef idx="1">
+              <a:schemeClr val="accent1"/>
+            </a:lnRef>
+            <a:fillRef idx="0">
+              <a:schemeClr val="accent1"/>
+            </a:fillRef>
+            <a:effectRef idx="0">
+              <a:schemeClr val="accent1"/>
+            </a:effectRef>
+            <a:fontRef idx="minor">
+              <a:schemeClr val="tx1"/>
+            </a:fontRef>
+          </p:style>
+        </p:cxnSp>
+        <p:sp>
+          <p:nvSpPr>
+            <p:cNvPr id="49" name="Oval 48">
+              <a:extLst>
+                <a:ext uri="{FF2B5EF4-FFF2-40B4-BE49-F238E27FC236}">
+                  <a16:creationId xmlns:a16="http://schemas.microsoft.com/office/drawing/2014/main" id="{6FB7B3AE-E99B-4F16-A8A8-5D56D0254A29}"/>
+                </a:ext>
+              </a:extLst>
+            </p:cNvPr>
+            <p:cNvSpPr/>
+            <p:nvPr/>
+          </p:nvSpPr>
+          <p:spPr>
+            <a:xfrm>
+              <a:off x="5375656" y="1919605"/>
+              <a:ext cx="3048000" cy="3048000"/>
+            </a:xfrm>
+            <a:prstGeom prst="ellipse">
+              <a:avLst/>
+            </a:prstGeom>
+            <a:solidFill>
+              <a:srgbClr val="FFA500"/>
+            </a:solidFill>
+            <a:ln w="76200">
+              <a:noFill/>
+            </a:ln>
+          </p:spPr>
+          <p:style>
+            <a:lnRef idx="2">
+              <a:schemeClr val="accent1">
+                <a:shade val="50000"/>
+              </a:schemeClr>
+            </a:lnRef>
+            <a:fillRef idx="1">
+              <a:schemeClr val="accent1"/>
+            </a:fillRef>
+            <a:effectRef idx="0">
+              <a:schemeClr val="accent1"/>
+            </a:effectRef>
+            <a:fontRef idx="minor">
+              <a:schemeClr val="lt1"/>
+            </a:fontRef>
+          </p:style>
+          <p:txBody>
+            <a:bodyPr rtlCol="0" anchor="ctr"/>
+            <a:lstStyle/>
+            <a:p>
+              <a:pPr algn="ctr"/>
+              <a:endParaRPr lang="en-US" dirty="0"/>
+            </a:p>
+          </p:txBody>
+        </p:sp>
+        <p:sp>
+          <p:nvSpPr>
+            <p:cNvPr id="50" name="Oval 49">
+              <a:extLst>
+                <a:ext uri="{FF2B5EF4-FFF2-40B4-BE49-F238E27FC236}">
+                  <a16:creationId xmlns:a16="http://schemas.microsoft.com/office/drawing/2014/main" id="{84ACCB3D-918E-4B7F-9B13-DC4DAF97E42A}"/>
+                </a:ext>
+              </a:extLst>
+            </p:cNvPr>
+            <p:cNvSpPr/>
+            <p:nvPr/>
+          </p:nvSpPr>
+          <p:spPr>
+            <a:xfrm>
+              <a:off x="6861556" y="3390900"/>
+              <a:ext cx="76200" cy="76200"/>
+            </a:xfrm>
+            <a:prstGeom prst="ellipse">
+              <a:avLst/>
+            </a:prstGeom>
+            <a:solidFill>
+              <a:schemeClr val="bg1"/>
+            </a:solidFill>
+            <a:ln>
+              <a:solidFill>
+                <a:schemeClr val="bg1"/>
+              </a:solidFill>
+            </a:ln>
+          </p:spPr>
+          <p:style>
+            <a:lnRef idx="2">
+              <a:schemeClr val="accent1">
+                <a:shade val="50000"/>
+              </a:schemeClr>
+            </a:lnRef>
+            <a:fillRef idx="1">
+              <a:schemeClr val="accent1"/>
+            </a:fillRef>
+            <a:effectRef idx="0">
+              <a:schemeClr val="accent1"/>
+            </a:effectRef>
+            <a:fontRef idx="minor">
+              <a:schemeClr val="lt1"/>
+            </a:fontRef>
+          </p:style>
+          <p:txBody>
+            <a:bodyPr rtlCol="0" anchor="ctr"/>
+            <a:lstStyle/>
+            <a:p>
+              <a:pPr algn="ctr"/>
+              <a:endParaRPr lang="en-US"/>
+            </a:p>
+          </p:txBody>
+        </p:sp>
+      </p:grpSp>
+      <p:grpSp>
+        <p:nvGrpSpPr>
+          <p:cNvPr id="58" name="Group 57">
+            <a:extLst>
+              <a:ext uri="{FF2B5EF4-FFF2-40B4-BE49-F238E27FC236}">
+                <a16:creationId xmlns:a16="http://schemas.microsoft.com/office/drawing/2014/main" id="{F2B23760-862E-4301-B161-B1B9F1EAE5F4}"/>
+              </a:ext>
+            </a:extLst>
+          </p:cNvPr>
+          <p:cNvGrpSpPr/>
+          <p:nvPr/>
+        </p:nvGrpSpPr>
+        <p:grpSpPr>
+          <a:xfrm>
+            <a:off x="1905000" y="4023360"/>
+            <a:ext cx="762000" cy="762000"/>
+            <a:chOff x="1905000" y="4023360"/>
+            <a:chExt cx="762000" cy="762000"/>
+          </a:xfrm>
+        </p:grpSpPr>
+        <p:sp>
+          <p:nvSpPr>
+            <p:cNvPr id="52" name="Rectangle 51">
+              <a:extLst>
+                <a:ext uri="{FF2B5EF4-FFF2-40B4-BE49-F238E27FC236}">
+                  <a16:creationId xmlns:a16="http://schemas.microsoft.com/office/drawing/2014/main" id="{74347963-AF6A-42C4-8C8D-5FACB3355412}"/>
+                </a:ext>
+              </a:extLst>
+            </p:cNvPr>
+            <p:cNvSpPr/>
+            <p:nvPr/>
+          </p:nvSpPr>
+          <p:spPr>
+            <a:xfrm>
+              <a:off x="1905000" y="4023360"/>
+              <a:ext cx="762000" cy="762000"/>
+            </a:xfrm>
+            <a:prstGeom prst="rect">
+              <a:avLst/>
+            </a:prstGeom>
+            <a:solidFill>
+              <a:srgbClr val="FFA500"/>
+            </a:solidFill>
+            <a:ln>
+              <a:solidFill>
+                <a:schemeClr val="bg1"/>
+              </a:solidFill>
+            </a:ln>
+          </p:spPr>
+          <p:style>
+            <a:lnRef idx="2">
+              <a:schemeClr val="accent1">
+                <a:shade val="50000"/>
+              </a:schemeClr>
+            </a:lnRef>
+            <a:fillRef idx="1">
+              <a:schemeClr val="accent1"/>
+            </a:fillRef>
+            <a:effectRef idx="0">
+              <a:schemeClr val="accent1"/>
+            </a:effectRef>
+            <a:fontRef idx="minor">
+              <a:schemeClr val="lt1"/>
+            </a:fontRef>
+          </p:style>
+          <p:txBody>
+            <a:bodyPr rtlCol="0" anchor="ctr"/>
+            <a:lstStyle/>
+            <a:p>
+              <a:pPr algn="ctr"/>
+              <a:endParaRPr lang="en-US"/>
+            </a:p>
+          </p:txBody>
+        </p:sp>
+        <p:grpSp>
+          <p:nvGrpSpPr>
+            <p:cNvPr id="56" name="Group 55">
+              <a:extLst>
+                <a:ext uri="{FF2B5EF4-FFF2-40B4-BE49-F238E27FC236}">
+                  <a16:creationId xmlns:a16="http://schemas.microsoft.com/office/drawing/2014/main" id="{A428E5BC-6AA2-4A84-9EA7-95F459BC52D4}"/>
+                </a:ext>
+              </a:extLst>
+            </p:cNvPr>
+            <p:cNvGrpSpPr/>
+            <p:nvPr/>
+          </p:nvGrpSpPr>
+          <p:grpSpPr>
+            <a:xfrm>
+              <a:off x="1993012" y="4114323"/>
+              <a:ext cx="585976" cy="580073"/>
+              <a:chOff x="1963678" y="4076700"/>
+              <a:chExt cx="585976" cy="580073"/>
+            </a:xfrm>
+          </p:grpSpPr>
+          <p:sp>
+            <p:nvSpPr>
+              <p:cNvPr id="53" name="Oval 52">
+                <a:extLst>
+                  <a:ext uri="{FF2B5EF4-FFF2-40B4-BE49-F238E27FC236}">
+                    <a16:creationId xmlns:a16="http://schemas.microsoft.com/office/drawing/2014/main" id="{39B58883-6922-4AA2-8161-B5060A82D107}"/>
+                  </a:ext>
+                </a:extLst>
+              </p:cNvPr>
+              <p:cNvSpPr/>
+              <p:nvPr/>
+            </p:nvSpPr>
+            <p:spPr>
+              <a:xfrm>
+                <a:off x="1963678" y="4076700"/>
+                <a:ext cx="381000" cy="381000"/>
+              </a:xfrm>
+              <a:prstGeom prst="ellipse">
+                <a:avLst/>
+              </a:prstGeom>
+              <a:noFill/>
+              <a:ln w="76200">
+                <a:solidFill>
+                  <a:schemeClr val="bg1"/>
+                </a:solidFill>
+              </a:ln>
+            </p:spPr>
+            <p:style>
+              <a:lnRef idx="2">
+                <a:schemeClr val="accent1">
+                  <a:shade val="50000"/>
+                </a:schemeClr>
+              </a:lnRef>
+              <a:fillRef idx="1">
+                <a:schemeClr val="accent1"/>
+              </a:fillRef>
+              <a:effectRef idx="0">
+                <a:schemeClr val="accent1"/>
+              </a:effectRef>
+              <a:fontRef idx="minor">
+                <a:schemeClr val="lt1"/>
+              </a:fontRef>
+            </p:style>
+            <p:txBody>
+              <a:bodyPr rtlCol="0" anchor="ctr"/>
+              <a:lstStyle/>
+              <a:p>
+                <a:pPr algn="ctr"/>
+                <a:endParaRPr lang="en-US"/>
+              </a:p>
+            </p:txBody>
+          </p:sp>
+          <p:cxnSp>
+            <p:nvCxnSpPr>
+              <p:cNvPr id="55" name="Straight Connector 54">
+                <a:extLst>
+                  <a:ext uri="{FF2B5EF4-FFF2-40B4-BE49-F238E27FC236}">
+                    <a16:creationId xmlns:a16="http://schemas.microsoft.com/office/drawing/2014/main" id="{12CAFCCF-B7D7-48E2-8733-747828BB8588}"/>
+                  </a:ext>
+                </a:extLst>
+              </p:cNvPr>
+              <p:cNvCxnSpPr>
+                <a:cxnSpLocks/>
+                <a:stCxn id="53" idx="5"/>
+              </p:cNvCxnSpPr>
+              <p:nvPr/>
+            </p:nvCxnSpPr>
+            <p:spPr>
+              <a:xfrm>
+                <a:off x="2288882" y="4401904"/>
+                <a:ext cx="260772" cy="254869"/>
+              </a:xfrm>
+              <a:prstGeom prst="line">
+                <a:avLst/>
+              </a:prstGeom>
+              <a:ln w="76200">
+                <a:solidFill>
+                  <a:schemeClr val="bg1"/>
+                </a:solidFill>
+              </a:ln>
+            </p:spPr>
+            <p:style>
+              <a:lnRef idx="1">
+                <a:schemeClr val="accent1"/>
+              </a:lnRef>
+              <a:fillRef idx="0">
+                <a:schemeClr val="accent1"/>
+              </a:fillRef>
+              <a:effectRef idx="0">
+                <a:schemeClr val="accent1"/>
+              </a:effectRef>
+              <a:fontRef idx="minor">
+                <a:schemeClr val="tx1"/>
+              </a:fontRef>
+            </p:style>
+          </p:cxnSp>
+        </p:grpSp>
+      </p:grpSp>
+    </p:spTree>
+    <p:extLst>
+      <p:ext uri="{BB962C8B-B14F-4D97-AF65-F5344CB8AC3E}">
+        <p14:creationId xmlns:p14="http://schemas.microsoft.com/office/powerpoint/2010/main" val="2254637654"/>
+      </p:ext>
+    </p:extLst>
+  </p:cSld>
+  <p:clrMapOvr>
+    <a:masterClrMapping/>
+  </p:clrMapOvr>
+</p:sld>
+</file>
+
+<file path=ppt/slides/slide7.xml><?xml version="1.0" encoding="utf-8"?>
+<p:sld xmlns:a="http://schemas.openxmlformats.org/drawingml/2006/main" xmlns:r="http://schemas.openxmlformats.org/officeDocument/2006/relationships" xmlns:p="http://schemas.openxmlformats.org/presentationml/2006/main">
+  <p:cSld>
+    <p:spTree>
+      <p:nvGrpSpPr>
+        <p:cNvPr id="1" name=""/>
+        <p:cNvGrpSpPr/>
+        <p:nvPr/>
+      </p:nvGrpSpPr>
+      <p:grpSpPr>
+        <a:xfrm>
+          <a:off x="0" y="0"/>
+          <a:ext cx="0" cy="0"/>
+          <a:chOff x="0" y="0"/>
+          <a:chExt cx="0" cy="0"/>
+        </a:xfrm>
+      </p:grpSpPr>
+      <p:grpSp>
+        <p:nvGrpSpPr>
+          <p:cNvPr id="9" name="Group 8">
+            <a:extLst>
+              <a:ext uri="{FF2B5EF4-FFF2-40B4-BE49-F238E27FC236}">
+                <a16:creationId xmlns:a16="http://schemas.microsoft.com/office/drawing/2014/main" id="{10F691B7-F7FD-40E9-81F2-03BA62935993}"/>
+              </a:ext>
+            </a:extLst>
+          </p:cNvPr>
+          <p:cNvGrpSpPr/>
+          <p:nvPr/>
+        </p:nvGrpSpPr>
+        <p:grpSpPr>
+          <a:xfrm>
+            <a:off x="821054" y="1470660"/>
+            <a:ext cx="1143000" cy="1143000"/>
+            <a:chOff x="821054" y="1470660"/>
+            <a:chExt cx="1143000" cy="1143000"/>
+          </a:xfrm>
+        </p:grpSpPr>
+        <p:sp>
+          <p:nvSpPr>
+            <p:cNvPr id="4" name="Rectangle 3">
+              <a:extLst>
+                <a:ext uri="{FF2B5EF4-FFF2-40B4-BE49-F238E27FC236}">
+                  <a16:creationId xmlns:a16="http://schemas.microsoft.com/office/drawing/2014/main" id="{5F0062AF-E53E-4ECD-BC69-02D660AE1E5D}"/>
+                </a:ext>
+              </a:extLst>
+            </p:cNvPr>
+            <p:cNvSpPr/>
+            <p:nvPr/>
+          </p:nvSpPr>
+          <p:spPr>
+            <a:xfrm>
+              <a:off x="821054" y="1470660"/>
+              <a:ext cx="1143000" cy="1143000"/>
+            </a:xfrm>
+            <a:prstGeom prst="rect">
+              <a:avLst/>
+            </a:prstGeom>
+            <a:solidFill>
+              <a:srgbClr val="FFA500"/>
+            </a:solidFill>
+            <a:ln>
+              <a:solidFill>
+                <a:schemeClr val="bg1"/>
+              </a:solidFill>
+            </a:ln>
+          </p:spPr>
+          <p:style>
+            <a:lnRef idx="2">
+              <a:schemeClr val="accent1">
+                <a:shade val="50000"/>
+              </a:schemeClr>
+            </a:lnRef>
+            <a:fillRef idx="1">
+              <a:schemeClr val="accent1"/>
+            </a:fillRef>
+            <a:effectRef idx="0">
+              <a:schemeClr val="accent1"/>
+            </a:effectRef>
+            <a:fontRef idx="minor">
+              <a:schemeClr val="lt1"/>
+            </a:fontRef>
+          </p:style>
+          <p:txBody>
+            <a:bodyPr rtlCol="0" anchor="ctr"/>
+            <a:lstStyle/>
+            <a:p>
+              <a:pPr algn="ctr"/>
+              <a:endParaRPr lang="en-US"/>
+            </a:p>
+          </p:txBody>
+        </p:sp>
+        <p:sp>
+          <p:nvSpPr>
+            <p:cNvPr id="5" name="Rectangle: Rounded Corners 4">
+              <a:extLst>
+                <a:ext uri="{FF2B5EF4-FFF2-40B4-BE49-F238E27FC236}">
+                  <a16:creationId xmlns:a16="http://schemas.microsoft.com/office/drawing/2014/main" id="{7B08B642-1225-4DAF-BE5C-53E914670D5B}"/>
+                </a:ext>
+              </a:extLst>
+            </p:cNvPr>
+            <p:cNvSpPr/>
+            <p:nvPr/>
+          </p:nvSpPr>
+          <p:spPr>
+            <a:xfrm>
+              <a:off x="1057751" y="1609725"/>
+              <a:ext cx="669606" cy="864870"/>
+            </a:xfrm>
+            <a:prstGeom prst="roundRect">
+              <a:avLst/>
+            </a:prstGeom>
+            <a:solidFill>
+              <a:srgbClr val="FFA500"/>
+            </a:solidFill>
+            <a:ln w="57150">
+              <a:solidFill>
+                <a:schemeClr val="bg1"/>
+              </a:solidFill>
+            </a:ln>
+          </p:spPr>
+          <p:style>
+            <a:lnRef idx="2">
+              <a:schemeClr val="accent1">
+                <a:shade val="50000"/>
+              </a:schemeClr>
+            </a:lnRef>
+            <a:fillRef idx="1">
+              <a:schemeClr val="accent1"/>
+            </a:fillRef>
+            <a:effectRef idx="0">
+              <a:schemeClr val="accent1"/>
+            </a:effectRef>
+            <a:fontRef idx="minor">
+              <a:schemeClr val="lt1"/>
+            </a:fontRef>
+          </p:style>
+          <p:txBody>
+            <a:bodyPr rtlCol="0" anchor="ctr"/>
+            <a:lstStyle/>
+            <a:p>
+              <a:pPr algn="ctr"/>
+              <a:endParaRPr lang="en-US"/>
+            </a:p>
+          </p:txBody>
+        </p:sp>
+        <p:sp>
+          <p:nvSpPr>
+            <p:cNvPr id="6" name="Rectangle: Rounded Corners 5">
+              <a:extLst>
+                <a:ext uri="{FF2B5EF4-FFF2-40B4-BE49-F238E27FC236}">
+                  <a16:creationId xmlns:a16="http://schemas.microsoft.com/office/drawing/2014/main" id="{998BE3F5-9648-46E2-909F-FAA2C6803070}"/>
+                </a:ext>
+              </a:extLst>
+            </p:cNvPr>
+            <p:cNvSpPr/>
+            <p:nvPr/>
+          </p:nvSpPr>
+          <p:spPr>
+            <a:xfrm>
+              <a:off x="1205865" y="2023109"/>
+              <a:ext cx="381000" cy="38100"/>
+            </a:xfrm>
+            <a:prstGeom prst="roundRect">
+              <a:avLst/>
+            </a:prstGeom>
+            <a:solidFill>
+              <a:schemeClr val="bg1"/>
+            </a:solidFill>
+            <a:ln>
+              <a:solidFill>
+                <a:schemeClr val="bg1"/>
+              </a:solidFill>
+            </a:ln>
+          </p:spPr>
+          <p:style>
+            <a:lnRef idx="2">
+              <a:schemeClr val="accent1">
+                <a:shade val="50000"/>
+              </a:schemeClr>
+            </a:lnRef>
+            <a:fillRef idx="1">
+              <a:schemeClr val="accent1"/>
+            </a:fillRef>
+            <a:effectRef idx="0">
+              <a:schemeClr val="accent1"/>
+            </a:effectRef>
+            <a:fontRef idx="minor">
+              <a:schemeClr val="lt1"/>
+            </a:fontRef>
+          </p:style>
+          <p:txBody>
+            <a:bodyPr rtlCol="0" anchor="ctr"/>
+            <a:lstStyle/>
+            <a:p>
+              <a:pPr algn="ctr"/>
+              <a:endParaRPr lang="en-US"/>
+            </a:p>
+          </p:txBody>
+        </p:sp>
+        <p:sp>
+          <p:nvSpPr>
+            <p:cNvPr id="7" name="Rectangle: Rounded Corners 6">
+              <a:extLst>
+                <a:ext uri="{FF2B5EF4-FFF2-40B4-BE49-F238E27FC236}">
+                  <a16:creationId xmlns:a16="http://schemas.microsoft.com/office/drawing/2014/main" id="{8D0B9840-CD61-4BDC-8365-F813190EE8AF}"/>
+                </a:ext>
+              </a:extLst>
+            </p:cNvPr>
+            <p:cNvSpPr/>
+            <p:nvPr/>
+          </p:nvSpPr>
+          <p:spPr>
+            <a:xfrm>
+              <a:off x="1205865" y="2229802"/>
+              <a:ext cx="381000" cy="38100"/>
+            </a:xfrm>
+            <a:prstGeom prst="roundRect">
+              <a:avLst/>
+            </a:prstGeom>
+            <a:solidFill>
+              <a:schemeClr val="bg1"/>
+            </a:solidFill>
+            <a:ln>
+              <a:solidFill>
+                <a:schemeClr val="bg1"/>
+              </a:solidFill>
+            </a:ln>
+          </p:spPr>
+          <p:style>
+            <a:lnRef idx="2">
+              <a:schemeClr val="accent1">
+                <a:shade val="50000"/>
+              </a:schemeClr>
+            </a:lnRef>
+            <a:fillRef idx="1">
+              <a:schemeClr val="accent1"/>
+            </a:fillRef>
+            <a:effectRef idx="0">
+              <a:schemeClr val="accent1"/>
+            </a:effectRef>
+            <a:fontRef idx="minor">
+              <a:schemeClr val="lt1"/>
+            </a:fontRef>
+          </p:style>
+          <p:txBody>
+            <a:bodyPr rtlCol="0" anchor="ctr"/>
+            <a:lstStyle/>
+            <a:p>
+              <a:pPr algn="ctr"/>
+              <a:endParaRPr lang="en-US"/>
+            </a:p>
+          </p:txBody>
+        </p:sp>
+        <p:sp>
+          <p:nvSpPr>
+            <p:cNvPr id="8" name="Rectangle: Rounded Corners 7">
+              <a:extLst>
+                <a:ext uri="{FF2B5EF4-FFF2-40B4-BE49-F238E27FC236}">
+                  <a16:creationId xmlns:a16="http://schemas.microsoft.com/office/drawing/2014/main" id="{D5449E76-C1C3-45FC-9C48-4D45DC340940}"/>
+                </a:ext>
+              </a:extLst>
+            </p:cNvPr>
+            <p:cNvSpPr/>
+            <p:nvPr/>
+          </p:nvSpPr>
+          <p:spPr>
+            <a:xfrm>
+              <a:off x="1202054" y="1816416"/>
+              <a:ext cx="381000" cy="38100"/>
+            </a:xfrm>
+            <a:prstGeom prst="roundRect">
+              <a:avLst/>
+            </a:prstGeom>
+            <a:solidFill>
+              <a:schemeClr val="bg1"/>
+            </a:solidFill>
+            <a:ln>
+              <a:solidFill>
+                <a:schemeClr val="bg1"/>
+              </a:solidFill>
+            </a:ln>
+          </p:spPr>
+          <p:style>
+            <a:lnRef idx="2">
+              <a:schemeClr val="accent1">
+                <a:shade val="50000"/>
+              </a:schemeClr>
+            </a:lnRef>
+            <a:fillRef idx="1">
+              <a:schemeClr val="accent1"/>
+            </a:fillRef>
+            <a:effectRef idx="0">
+              <a:schemeClr val="accent1"/>
+            </a:effectRef>
+            <a:fontRef idx="minor">
+              <a:schemeClr val="lt1"/>
+            </a:fontRef>
+          </p:style>
+          <p:txBody>
+            <a:bodyPr rtlCol="0" anchor="ctr"/>
+            <a:lstStyle/>
+            <a:p>
+              <a:pPr algn="ctr"/>
+              <a:endParaRPr lang="en-US"/>
+            </a:p>
+          </p:txBody>
+        </p:sp>
+      </p:grpSp>
+    </p:spTree>
+    <p:extLst>
+      <p:ext uri="{BB962C8B-B14F-4D97-AF65-F5344CB8AC3E}">
+        <p14:creationId xmlns:p14="http://schemas.microsoft.com/office/powerpoint/2010/main" val="519031047"/>
       </p:ext>
     </p:extLst>
   </p:cSld>

</xml_diff>